<commit_message>
Lots of edits. A few comments with things for you to do. Looking good and almost done IMO.
</commit_message>
<xml_diff>
--- a/Presentations/cogsci-2017-poster.pptx
+++ b/Presentations/cogsci-2017-poster.pptx
@@ -122,6 +122,96 @@
     </p:ext>
   </p:extLst>
 </p:presentation>
+</file>
+
+<file path=ppt/commentAuthors.xml><?xml version="1.0" encoding="utf-8"?>
+<p:cmAuthorLst xmlns:a="http://schemas.openxmlformats.org/drawingml/2006/main" xmlns:r="http://schemas.openxmlformats.org/officeDocument/2006/relationships" xmlns:p="http://schemas.openxmlformats.org/presentationml/2006/main">
+  <p:cmAuthor id="1" name="Joe Austerweil" initials="JA" lastIdx="1" clrIdx="0">
+    <p:extLst>
+      <p:ext uri="{19B8F6BF-5375-455C-9EA6-DF929625EA0E}">
+        <p15:presenceInfo xmlns:p15="http://schemas.microsoft.com/office/powerpoint/2012/main" userId="" providerId=""/>
+      </p:ext>
+    </p:extLst>
+  </p:cmAuthor>
+  <p:cmAuthor id="2" name="Joe Austerweil" initials="JA [2]" lastIdx="1" clrIdx="1">
+    <p:extLst>
+      <p:ext uri="{19B8F6BF-5375-455C-9EA6-DF929625EA0E}">
+        <p15:presenceInfo xmlns:p15="http://schemas.microsoft.com/office/powerpoint/2012/main" userId="" providerId=""/>
+      </p:ext>
+    </p:extLst>
+  </p:cmAuthor>
+  <p:cmAuthor id="3" name="Joe Austerweil" initials="JA [3]" lastIdx="1" clrIdx="2">
+    <p:extLst>
+      <p:ext uri="{19B8F6BF-5375-455C-9EA6-DF929625EA0E}">
+        <p15:presenceInfo xmlns:p15="http://schemas.microsoft.com/office/powerpoint/2012/main" userId="" providerId=""/>
+      </p:ext>
+    </p:extLst>
+  </p:cmAuthor>
+  <p:cmAuthor id="4" name="Joe Austerweil" initials="JA [4]" lastIdx="1" clrIdx="3">
+    <p:extLst>
+      <p:ext uri="{19B8F6BF-5375-455C-9EA6-DF929625EA0E}">
+        <p15:presenceInfo xmlns:p15="http://schemas.microsoft.com/office/powerpoint/2012/main" userId="" providerId=""/>
+      </p:ext>
+    </p:extLst>
+  </p:cmAuthor>
+  <p:cmAuthor id="5" name="Joe Austerweil" initials="JA [5]" lastIdx="1" clrIdx="4">
+    <p:extLst>
+      <p:ext uri="{19B8F6BF-5375-455C-9EA6-DF929625EA0E}">
+        <p15:presenceInfo xmlns:p15="http://schemas.microsoft.com/office/powerpoint/2012/main" userId="" providerId=""/>
+      </p:ext>
+    </p:extLst>
+  </p:cmAuthor>
+</p:cmAuthorLst>
+</file>
+
+<file path=ppt/comments/comment1.xml><?xml version="1.0" encoding="utf-8"?>
+<p:cmLst xmlns:a="http://schemas.openxmlformats.org/drawingml/2006/main" xmlns:r="http://schemas.openxmlformats.org/officeDocument/2006/relationships" xmlns:p="http://schemas.openxmlformats.org/presentationml/2006/main">
+  <p:cm authorId="1" dt="2017-06-22T20:53:18.230" idx="1">
+    <p:pos x="7001" y="10855"/>
+    <p:text>Do you mean Ward 1995 here?</p:text>
+    <p:extLst>
+      <p:ext uri="{C676402C-5697-4E1C-873F-D02D1690AC5C}">
+        <p15:threadingInfo xmlns:p15="http://schemas.microsoft.com/office/powerpoint/2012/main" timeZoneBias="300"/>
+      </p:ext>
+    </p:extLst>
+  </p:cm>
+  <p:cm authorId="2" dt="2017-06-22T20:55:32.806" idx="1">
+    <p:pos x="8132" y="11300"/>
+    <p:text>I don't get what you mean in the description of "Path of Least Resistance/Copy &amp; Tweak".</p:text>
+    <p:extLst>
+      <p:ext uri="{C676402C-5697-4E1C-873F-D02D1690AC5C}">
+        <p15:threadingInfo xmlns:p15="http://schemas.microsoft.com/office/powerpoint/2012/main" timeZoneBias="300"/>
+      </p:ext>
+    </p:extLst>
+  </p:cm>
+  <p:cm authorId="3" dt="2017-06-22T21:13:05.189" idx="1">
+    <p:pos x="10995" y="6472"/>
+    <p:text>This area is too bunchy. I can't move or edit it for some reason. Also change "Ss" -&gt; "Ps"</p:text>
+    <p:extLst>
+      <p:ext uri="{C676402C-5697-4E1C-873F-D02D1690AC5C}">
+        <p15:threadingInfo xmlns:p15="http://schemas.microsoft.com/office/powerpoint/2012/main" timeZoneBias="300"/>
+      </p:ext>
+    </p:extLst>
+  </p:cm>
+  <p:cm authorId="4" dt="2017-06-22T21:16:41.743" idx="1">
+    <p:pos x="9826" y="15542"/>
+    <p:text>Middle and Bottom are opposite of stimuli images</p:text>
+    <p:extLst>
+      <p:ext uri="{C676402C-5697-4E1C-873F-D02D1690AC5C}">
+        <p15:threadingInfo xmlns:p15="http://schemas.microsoft.com/office/powerpoint/2012/main" timeZoneBias="300"/>
+      </p:ext>
+    </p:extLst>
+  </p:cm>
+  <p:cm authorId="5" dt="2017-06-22T21:18:37.719" idx="1">
+    <p:pos x="28193" y="7103"/>
+    <p:text>I"m torn about showing Exponentiated Luce choice rule, but I feel like we should have a line that says generation via exponentiated luce choice rule with parameter \theta...</p:text>
+    <p:extLst>
+      <p:ext uri="{C676402C-5697-4E1C-873F-D02D1690AC5C}">
+        <p15:threadingInfo xmlns:p15="http://schemas.microsoft.com/office/powerpoint/2012/main" timeZoneBias="300"/>
+      </p:ext>
+    </p:extLst>
+  </p:cm>
+</p:cmLst>
 </file>
 
 <file path=ppt/notesMasters/notesMaster1.xml><?xml version="1.0" encoding="utf-8"?>
@@ -3543,7 +3633,18 @@
                   <a:ea typeface="Raleway SemiBold" charset="0"/>
                   <a:cs typeface="Raleway SemiBold" charset="0"/>
                 </a:rPr>
-                <a:t>PACKER: An Exemplar Model of Category Generation.</a:t>
+                <a:t>PACKER: An Exemplar Model of Category </a:t>
+              </a:r>
+              <a:r>
+                <a:rPr lang="en-US" sz="8000" b="1" dirty="0" smtClean="0">
+                  <a:solidFill>
+                    <a:schemeClr val="accent6"/>
+                  </a:solidFill>
+                  <a:latin typeface="Raleway SemiBold" charset="0"/>
+                  <a:ea typeface="Raleway SemiBold" charset="0"/>
+                  <a:cs typeface="Raleway SemiBold" charset="0"/>
+                </a:rPr>
+                <a:t>Generation</a:t>
               </a:r>
               <a:endParaRPr lang="en-US" sz="8000" b="1" dirty="0">
                 <a:solidFill>
@@ -3601,7 +3702,18 @@
                   <a:ea typeface="Raleway" charset="0"/>
                   <a:cs typeface="Raleway" charset="0"/>
                 </a:rPr>
-                <a:t>University of Wisconsin-Madison</a:t>
+                <a:t>University of </a:t>
+              </a:r>
+              <a:r>
+                <a:rPr lang="en-US" sz="6000" dirty="0" smtClean="0">
+                  <a:solidFill>
+                    <a:schemeClr val="accent6"/>
+                  </a:solidFill>
+                  <a:latin typeface="Raleway" charset="0"/>
+                  <a:ea typeface="Raleway" charset="0"/>
+                  <a:cs typeface="Raleway" charset="0"/>
+                </a:rPr>
+                <a:t>Wisconsin-Madison; Department of Psychology</a:t>
               </a:r>
               <a:endParaRPr lang="en-US" sz="6000" dirty="0">
                 <a:solidFill>
@@ -3685,7 +3797,7 @@
         <p:spPr>
           <a:xfrm>
             <a:off x="914399" y="10334578"/>
-            <a:ext cx="12115800" cy="11480066"/>
+            <a:ext cx="12115800" cy="9987349"/>
           </a:xfrm>
           <a:prstGeom prst="rect">
             <a:avLst/>
@@ -3749,15 +3861,26 @@
               <a:t>: </a:t>
             </a:r>
             <a:r>
-              <a:rPr lang="en-US" sz="3600" dirty="0" err="1">
-                <a:solidFill>
-                  <a:schemeClr val="accent6"/>
-                </a:solidFill>
-                <a:latin typeface="Raleway" charset="0"/>
-                <a:ea typeface="Raleway" charset="0"/>
-                <a:cs typeface="Raleway" charset="0"/>
-              </a:rPr>
-              <a:t>Ss</a:t>
+              <a:rPr lang="en-US" sz="3600" dirty="0" smtClean="0">
+                <a:solidFill>
+                  <a:schemeClr val="accent6"/>
+                </a:solidFill>
+                <a:latin typeface="Raleway" charset="0"/>
+                <a:ea typeface="Raleway" charset="0"/>
+                <a:cs typeface="Raleway" charset="0"/>
+              </a:rPr>
+              <a:t>Ps drew pictures </a:t>
+            </a:r>
+            <a:r>
+              <a:rPr lang="en-US" sz="3600" dirty="0" smtClean="0">
+                <a:solidFill>
+                  <a:schemeClr val="accent6"/>
+                </a:solidFill>
+                <a:latin typeface="Raleway" charset="0"/>
+                <a:ea typeface="Raleway" charset="0"/>
+                <a:cs typeface="Raleway" charset="0"/>
+              </a:rPr>
+              <a:t>of new </a:t>
             </a:r>
             <a:r>
               <a:rPr lang="en-US" sz="3600" dirty="0">
@@ -3768,7 +3891,7 @@
                 <a:ea typeface="Raleway" charset="0"/>
                 <a:cs typeface="Raleway" charset="0"/>
               </a:rPr>
-              <a:t> </a:t>
+              <a:t>categories (e.g., new plants or animals), analyze what they created</a:t>
             </a:r>
             <a:r>
               <a:rPr lang="en-US" sz="3600" dirty="0" smtClean="0">
@@ -3779,18 +3902,7 @@
                 <a:ea typeface="Raleway" charset="0"/>
                 <a:cs typeface="Raleway" charset="0"/>
               </a:rPr>
-              <a:t>asked to draw pictures of new </a:t>
-            </a:r>
-            <a:r>
-              <a:rPr lang="en-US" sz="3600" dirty="0">
-                <a:solidFill>
-                  <a:schemeClr val="accent6"/>
-                </a:solidFill>
-                <a:latin typeface="Raleway" charset="0"/>
-                <a:ea typeface="Raleway" charset="0"/>
-                <a:cs typeface="Raleway" charset="0"/>
-              </a:rPr>
-              <a:t>categories (e.g., new plants or animals), analyze what they created</a:t>
+              <a:t>. (Ward, 1994</a:t>
             </a:r>
             <a:r>
               <a:rPr lang="en-US" sz="3600" dirty="0" smtClean="0">
@@ -3801,7 +3913,7 @@
                 <a:ea typeface="Raleway" charset="0"/>
                 <a:cs typeface="Raleway" charset="0"/>
               </a:rPr>
-              <a:t>. (Ward, 1994)</a:t>
+              <a:t>).</a:t>
             </a:r>
             <a:endParaRPr lang="en-US" sz="3600" dirty="0">
               <a:solidFill>
@@ -3844,17 +3956,6 @@
               <a:t>: </a:t>
             </a:r>
             <a:r>
-              <a:rPr lang="en-US" sz="3600" dirty="0" err="1" smtClean="0">
-                <a:solidFill>
-                  <a:schemeClr val="accent6"/>
-                </a:solidFill>
-                <a:latin typeface="Raleway" charset="0"/>
-                <a:ea typeface="Raleway" charset="0"/>
-                <a:cs typeface="Raleway" charset="0"/>
-              </a:rPr>
-              <a:t>Ss</a:t>
-            </a:r>
-            <a:r>
               <a:rPr lang="en-US" sz="3600" dirty="0" smtClean="0">
                 <a:solidFill>
                   <a:schemeClr val="accent6"/>
@@ -3863,7 +3964,62 @@
                 <a:ea typeface="Raleway" charset="0"/>
                 <a:cs typeface="Raleway" charset="0"/>
               </a:rPr>
-              <a:t> learn about categories in an artificial domain, then generate new categories (Jern &amp; Kemp. 2013). Designed to allow testing of formal models.</a:t>
+              <a:t>Ps </a:t>
+            </a:r>
+            <a:r>
+              <a:rPr lang="en-US" sz="3600" dirty="0" smtClean="0">
+                <a:solidFill>
+                  <a:schemeClr val="accent6"/>
+                </a:solidFill>
+                <a:latin typeface="Raleway" charset="0"/>
+                <a:ea typeface="Raleway" charset="0"/>
+                <a:cs typeface="Raleway" charset="0"/>
+              </a:rPr>
+              <a:t>learn about categories in an artificial domain, then generate new categories (Jern &amp; </a:t>
+            </a:r>
+            <a:r>
+              <a:rPr lang="en-US" sz="3600" dirty="0" smtClean="0">
+                <a:solidFill>
+                  <a:schemeClr val="accent6"/>
+                </a:solidFill>
+                <a:latin typeface="Raleway" charset="0"/>
+                <a:ea typeface="Raleway" charset="0"/>
+                <a:cs typeface="Raleway" charset="0"/>
+              </a:rPr>
+              <a:t>Kemp, </a:t>
+            </a:r>
+            <a:r>
+              <a:rPr lang="en-US" sz="3600" dirty="0" smtClean="0">
+                <a:solidFill>
+                  <a:schemeClr val="accent6"/>
+                </a:solidFill>
+                <a:latin typeface="Raleway" charset="0"/>
+                <a:ea typeface="Raleway" charset="0"/>
+                <a:cs typeface="Raleway" charset="0"/>
+              </a:rPr>
+              <a:t>2013). Designed to </a:t>
+            </a:r>
+            <a:r>
+              <a:rPr lang="en-US" sz="3600" dirty="0" smtClean="0">
+                <a:solidFill>
+                  <a:schemeClr val="accent6"/>
+                </a:solidFill>
+                <a:latin typeface="Raleway" charset="0"/>
+                <a:ea typeface="Raleway" charset="0"/>
+                <a:cs typeface="Raleway" charset="0"/>
+              </a:rPr>
+              <a:t>enable testing </a:t>
+            </a:r>
+            <a:r>
+              <a:rPr lang="en-US" sz="3600" dirty="0" smtClean="0">
+                <a:solidFill>
+                  <a:schemeClr val="accent6"/>
+                </a:solidFill>
+                <a:latin typeface="Raleway" charset="0"/>
+                <a:ea typeface="Raleway" charset="0"/>
+                <a:cs typeface="Raleway" charset="0"/>
+              </a:rPr>
+              <a:t>of formal models.</a:t>
             </a:r>
             <a:endParaRPr lang="en-US" sz="3600" b="1" dirty="0" smtClean="0">
               <a:solidFill>
@@ -3895,15 +4051,15 @@
               <a:t>Common </a:t>
             </a:r>
             <a:r>
-              <a:rPr lang="en-US" sz="3600" b="1" dirty="0">
-                <a:solidFill>
-                  <a:schemeClr val="accent6"/>
-                </a:solidFill>
-                <a:latin typeface="Raleway" charset="0"/>
-                <a:ea typeface="Raleway" charset="0"/>
-                <a:cs typeface="Raleway" charset="0"/>
-              </a:rPr>
-              <a:t>findings</a:t>
+              <a:rPr lang="en-US" sz="3600" b="1" dirty="0" smtClean="0">
+                <a:solidFill>
+                  <a:schemeClr val="accent6"/>
+                </a:solidFill>
+                <a:latin typeface="Raleway" charset="0"/>
+                <a:ea typeface="Raleway" charset="0"/>
+                <a:cs typeface="Raleway" charset="0"/>
+              </a:rPr>
+              <a:t>finding</a:t>
             </a:r>
             <a:r>
               <a:rPr lang="en-US" sz="3600" dirty="0">
@@ -3914,7 +4070,29 @@
                 <a:ea typeface="Raleway" charset="0"/>
                 <a:cs typeface="Raleway" charset="0"/>
               </a:rPr>
-              <a:t>: generated categories are distributionally similar to known categories:</a:t>
+              <a:t>.</a:t>
+            </a:r>
+            <a:r>
+              <a:rPr lang="en-US" sz="3600" dirty="0" smtClean="0">
+                <a:solidFill>
+                  <a:schemeClr val="accent6"/>
+                </a:solidFill>
+                <a:latin typeface="Raleway" charset="0"/>
+                <a:ea typeface="Raleway" charset="0"/>
+                <a:cs typeface="Raleway" charset="0"/>
+              </a:rPr>
+              <a:t> Generated </a:t>
+            </a:r>
+            <a:r>
+              <a:rPr lang="en-US" sz="3600" dirty="0">
+                <a:solidFill>
+                  <a:schemeClr val="accent6"/>
+                </a:solidFill>
+                <a:latin typeface="Raleway" charset="0"/>
+                <a:ea typeface="Raleway" charset="0"/>
+                <a:cs typeface="Raleway" charset="0"/>
+              </a:rPr>
+              <a:t>categories are distributionally similar to known categories:</a:t>
             </a:r>
           </a:p>
           <a:p>
@@ -4059,7 +4237,29 @@
                 <a:ea typeface="Raleway" charset="0"/>
                 <a:cs typeface="Raleway" charset="0"/>
               </a:rPr>
-              <a:t>: generated category members are copied from known members.</a:t>
+              <a:t>: </a:t>
+            </a:r>
+            <a:r>
+              <a:rPr lang="en-US" sz="3600" dirty="0" smtClean="0">
+                <a:solidFill>
+                  <a:schemeClr val="accent6"/>
+                </a:solidFill>
+                <a:latin typeface="Raleway" charset="0"/>
+                <a:ea typeface="Raleway" charset="0"/>
+                <a:cs typeface="Raleway" charset="0"/>
+              </a:rPr>
+              <a:t>Generated </a:t>
+            </a:r>
+            <a:r>
+              <a:rPr lang="en-US" sz="3600" dirty="0" smtClean="0">
+                <a:solidFill>
+                  <a:schemeClr val="accent6"/>
+                </a:solidFill>
+                <a:latin typeface="Raleway" charset="0"/>
+                <a:ea typeface="Raleway" charset="0"/>
+                <a:cs typeface="Raleway" charset="0"/>
+              </a:rPr>
+              <a:t>category members are copied from known members.</a:t>
             </a:r>
           </a:p>
           <a:p>
@@ -4090,7 +4290,29 @@
                 <a:ea typeface="Raleway" charset="0"/>
                 <a:cs typeface="Raleway" charset="0"/>
               </a:rPr>
-              <a:t>: New categories are samples from a domain-wide distribution. </a:t>
+              <a:t>: New categories are samples from a </a:t>
+            </a:r>
+            <a:r>
+              <a:rPr lang="en-US" sz="3600" dirty="0" smtClean="0">
+                <a:solidFill>
+                  <a:schemeClr val="accent6"/>
+                </a:solidFill>
+                <a:latin typeface="Raleway" charset="0"/>
+                <a:ea typeface="Raleway" charset="0"/>
+                <a:cs typeface="Raleway" charset="0"/>
+              </a:rPr>
+              <a:t>common, but latent, domain-wide </a:t>
+            </a:r>
+            <a:r>
+              <a:rPr lang="en-US" sz="3600" dirty="0" smtClean="0">
+                <a:solidFill>
+                  <a:schemeClr val="accent6"/>
+                </a:solidFill>
+                <a:latin typeface="Raleway" charset="0"/>
+                <a:ea typeface="Raleway" charset="0"/>
+                <a:cs typeface="Raleway" charset="0"/>
+              </a:rPr>
+              <a:t>distribution. </a:t>
             </a:r>
           </a:p>
         </p:txBody>
@@ -4103,8 +4325,8 @@
         </p:nvSpPr>
         <p:spPr>
           <a:xfrm>
-            <a:off x="914399" y="21655301"/>
-            <a:ext cx="12115800" cy="7197437"/>
+            <a:off x="914399" y="20931173"/>
+            <a:ext cx="12115800" cy="8210969"/>
           </a:xfrm>
           <a:prstGeom prst="rect">
             <a:avLst/>
@@ -4238,7 +4460,18 @@
                 <a:ea typeface="Raleway" charset="0"/>
                 <a:cs typeface="Raleway" charset="0"/>
               </a:rPr>
-              <a:t>. How do people ensure their creations are unique?</a:t>
+              <a:t>. </a:t>
+            </a:r>
+            <a:r>
+              <a:rPr lang="en-US" sz="3600" dirty="0" smtClean="0">
+                <a:solidFill>
+                  <a:schemeClr val="accent6"/>
+                </a:solidFill>
+                <a:latin typeface="Raleway" charset="0"/>
+                <a:ea typeface="Raleway" charset="0"/>
+                <a:cs typeface="Raleway" charset="0"/>
+              </a:rPr>
+              <a:t>New concepts should be different.</a:t>
             </a:r>
           </a:p>
           <a:p>
@@ -4251,17 +4484,6 @@
               </a:spcAft>
             </a:pPr>
             <a:r>
-              <a:rPr lang="en-US" sz="3600" b="1" dirty="0" smtClean="0">
-                <a:solidFill>
-                  <a:schemeClr val="accent6"/>
-                </a:solidFill>
-                <a:latin typeface="Raleway" charset="0"/>
-                <a:ea typeface="Raleway" charset="0"/>
-                <a:cs typeface="Raleway" charset="0"/>
-              </a:rPr>
-              <a:t>Our Contribution: </a:t>
-            </a:r>
-            <a:r>
               <a:rPr lang="en-US" sz="3600" dirty="0" smtClean="0">
                 <a:solidFill>
                   <a:schemeClr val="accent6"/>
@@ -4270,19 +4492,39 @@
                 <a:ea typeface="Raleway" charset="0"/>
                 <a:cs typeface="Raleway" charset="0"/>
               </a:rPr>
-              <a:t>We developed an exemplar-based approach to explain differences between generated and known categories, We evaluated our model in a novel experiment.</a:t>
-            </a:r>
-          </a:p>
-          <a:p>
-            <a:pPr marL="571500" indent="-571500">
+              <a:t>How </a:t>
+            </a:r>
+            <a:r>
+              <a:rPr lang="en-US" sz="3600" dirty="0" smtClean="0">
+                <a:solidFill>
+                  <a:schemeClr val="accent6"/>
+                </a:solidFill>
+                <a:latin typeface="Raleway" charset="0"/>
+                <a:ea typeface="Raleway" charset="0"/>
+                <a:cs typeface="Raleway" charset="0"/>
+              </a:rPr>
+              <a:t>do people ensure their creations are unique</a:t>
+            </a:r>
+            <a:r>
+              <a:rPr lang="en-US" sz="3600" dirty="0" smtClean="0">
+                <a:solidFill>
+                  <a:schemeClr val="accent6"/>
+                </a:solidFill>
+                <a:latin typeface="Raleway" charset="0"/>
+                <a:ea typeface="Raleway" charset="0"/>
+                <a:cs typeface="Raleway" charset="0"/>
+              </a:rPr>
+              <a:t>?</a:t>
+            </a:r>
+          </a:p>
+          <a:p>
+            <a:pPr>
               <a:spcBef>
                 <a:spcPts val="600"/>
               </a:spcBef>
               <a:spcAft>
                 <a:spcPts val="600"/>
               </a:spcAft>
-              <a:buFontTx/>
-              <a:buChar char="-"/>
             </a:pPr>
             <a:endParaRPr lang="en-US" sz="3600" dirty="0" smtClean="0">
               <a:solidFill>
@@ -4294,16 +4536,105 @@
             </a:endParaRPr>
           </a:p>
           <a:p>
-            <a:pPr marL="571500" indent="-571500">
+            <a:pPr>
               <a:spcBef>
                 <a:spcPts val="600"/>
               </a:spcBef>
               <a:spcAft>
                 <a:spcPts val="600"/>
               </a:spcAft>
-              <a:buFontTx/>
-              <a:buChar char="-"/>
             </a:pPr>
+            <a:r>
+              <a:rPr lang="en-US" sz="3600" b="1" dirty="0" smtClean="0">
+                <a:solidFill>
+                  <a:schemeClr val="accent6"/>
+                </a:solidFill>
+                <a:latin typeface="Raleway" charset="0"/>
+                <a:ea typeface="Raleway" charset="0"/>
+                <a:cs typeface="Raleway" charset="0"/>
+              </a:rPr>
+              <a:t>Our </a:t>
+            </a:r>
+            <a:r>
+              <a:rPr lang="en-US" sz="3600" b="1" dirty="0" smtClean="0">
+                <a:solidFill>
+                  <a:schemeClr val="accent6"/>
+                </a:solidFill>
+                <a:latin typeface="Raleway" charset="0"/>
+                <a:ea typeface="Raleway" charset="0"/>
+                <a:cs typeface="Raleway" charset="0"/>
+              </a:rPr>
+              <a:t>Contributions: </a:t>
+            </a:r>
+          </a:p>
+          <a:p>
+            <a:pPr marL="742950" indent="-742950">
+              <a:spcBef>
+                <a:spcPts val="600"/>
+              </a:spcBef>
+              <a:spcAft>
+                <a:spcPts val="600"/>
+              </a:spcAft>
+              <a:buFont typeface="+mj-lt"/>
+              <a:buAutoNum type="arabicPeriod"/>
+            </a:pPr>
+            <a:r>
+              <a:rPr lang="en-US" sz="3600" dirty="0" smtClean="0">
+                <a:solidFill>
+                  <a:schemeClr val="accent6"/>
+                </a:solidFill>
+                <a:latin typeface="Raleway" charset="0"/>
+                <a:ea typeface="Raleway" charset="0"/>
+                <a:cs typeface="Raleway" charset="0"/>
+              </a:rPr>
+              <a:t>Proposed contrast as a core principle of category generation.</a:t>
+            </a:r>
+          </a:p>
+          <a:p>
+            <a:pPr marL="742950" indent="-742950">
+              <a:spcBef>
+                <a:spcPts val="600"/>
+              </a:spcBef>
+              <a:spcAft>
+                <a:spcPts val="600"/>
+              </a:spcAft>
+              <a:buFont typeface="+mj-lt"/>
+              <a:buAutoNum type="arabicPeriod"/>
+            </a:pPr>
+            <a:r>
+              <a:rPr lang="en-US" sz="3600" dirty="0" smtClean="0">
+                <a:solidFill>
+                  <a:schemeClr val="accent6"/>
+                </a:solidFill>
+                <a:latin typeface="Raleway" charset="0"/>
+                <a:ea typeface="Raleway" charset="0"/>
+                <a:cs typeface="Raleway" charset="0"/>
+              </a:rPr>
+              <a:t>Developed an exemplar-based model that includes contrast as a basic mechanism for generating new categories.</a:t>
+            </a:r>
+          </a:p>
+          <a:p>
+            <a:pPr marL="742950" indent="-742950">
+              <a:spcBef>
+                <a:spcPts val="600"/>
+              </a:spcBef>
+              <a:spcAft>
+                <a:spcPts val="600"/>
+              </a:spcAft>
+              <a:buFont typeface="+mj-lt"/>
+              <a:buAutoNum type="arabicPeriod"/>
+            </a:pPr>
+            <a:r>
+              <a:rPr lang="en-US" sz="3600" dirty="0" smtClean="0">
+                <a:solidFill>
+                  <a:schemeClr val="accent6"/>
+                </a:solidFill>
+                <a:latin typeface="Raleway" charset="0"/>
+                <a:ea typeface="Raleway" charset="0"/>
+                <a:cs typeface="Raleway" charset="0"/>
+              </a:rPr>
+              <a:t>Tested differences between our model and others in a behavioral experiment. We found strong support for ours and contrast as a core principle of category generation.</a:t>
+            </a:r>
             <a:endParaRPr lang="en-US" sz="3600" dirty="0" smtClean="0">
               <a:solidFill>
                 <a:schemeClr val="accent6"/>
@@ -4464,8 +4795,8 @@
             </a:p>
           </p:txBody>
         </p:sp>
-        <mc:AlternateContent xmlns:mc="http://schemas.openxmlformats.org/markup-compatibility/2006" xmlns:a14="http://schemas.microsoft.com/office/drawing/2010/main">
-          <mc:Choice Requires="a14">
+        <mc:AlternateContent xmlns:mc="http://schemas.openxmlformats.org/markup-compatibility/2006">
+          <mc:Choice xmlns:a14="http://schemas.microsoft.com/office/drawing/2010/main" Requires="a14">
             <p:sp>
               <p:nvSpPr>
                 <p:cNvPr id="20" name="Rectangle 19"/>
@@ -4699,7 +5030,29 @@
                       <a:ea typeface="Raleway" charset="0"/>
                       <a:cs typeface="Raleway" charset="0"/>
                     </a:rPr>
-                    <a:t>: generation is constrained by within- and between-class similarity. </a:t>
+                    <a:t>: </a:t>
+                  </a:r>
+                  <a:r>
+                    <a:rPr lang="en-US" sz="3600" dirty="0" smtClean="0">
+                      <a:solidFill>
+                        <a:schemeClr val="accent6"/>
+                      </a:solidFill>
+                      <a:latin typeface="Raleway" charset="0"/>
+                      <a:ea typeface="Raleway" charset="0"/>
+                      <a:cs typeface="Raleway" charset="0"/>
+                    </a:rPr>
+                    <a:t>Generation </a:t>
+                  </a:r>
+                  <a:r>
+                    <a:rPr lang="en-US" sz="3600" dirty="0" smtClean="0">
+                      <a:solidFill>
+                        <a:schemeClr val="accent6"/>
+                      </a:solidFill>
+                      <a:latin typeface="Raleway" charset="0"/>
+                      <a:ea typeface="Raleway" charset="0"/>
+                      <a:cs typeface="Raleway" charset="0"/>
+                    </a:rPr>
+                    <a:t>is constrained by within- and between-class similarity. </a:t>
                   </a:r>
                 </a:p>
                 <a:p>
@@ -5463,7 +5816,7 @@
               </p:txBody>
             </p:sp>
           </mc:Choice>
-          <mc:Fallback xmlns="">
+          <mc:Fallback>
             <p:sp>
               <p:nvSpPr>
                 <p:cNvPr id="20" name="Rectangle 19"/>
@@ -5483,7 +5836,7 @@
                 <a:blipFill rotWithShape="0">
                   <a:blip r:embed="rId5"/>
                   <a:stretch>
-                    <a:fillRect l="-2085" t="-2090" r="-819"/>
+                    <a:fillRect l="-2085" t="-2015" r="-1750"/>
                   </a:stretch>
                 </a:blipFill>
               </p:spPr>
@@ -5596,18 +5949,7 @@
                 <a:ea typeface="Raleway SemiBold" charset="0"/>
                 <a:cs typeface="Raleway SemiBold" charset="0"/>
               </a:rPr>
-              <a:t>Behavioral </a:t>
-            </a:r>
-            <a:r>
-              <a:rPr lang="en-US" sz="4400" b="1" dirty="0" smtClean="0">
-                <a:solidFill>
-                  <a:schemeClr val="accent6"/>
-                </a:solidFill>
-                <a:latin typeface="Raleway SemiBold" charset="0"/>
-                <a:ea typeface="Raleway SemiBold" charset="0"/>
-                <a:cs typeface="Raleway SemiBold" charset="0"/>
-              </a:rPr>
-              <a:t>Results</a:t>
+              <a:t>Behavioral Results</a:t>
             </a:r>
             <a:endParaRPr lang="en-US" sz="3600" dirty="0">
               <a:solidFill>
@@ -5628,6 +5970,17 @@
               </a:spcAft>
             </a:pPr>
             <a:r>
+              <a:rPr lang="en-US" sz="3600" dirty="0" err="1" smtClean="0">
+                <a:solidFill>
+                  <a:schemeClr val="accent6"/>
+                </a:solidFill>
+                <a:latin typeface="Raleway" charset="0"/>
+                <a:ea typeface="Raleway" charset="0"/>
+                <a:cs typeface="Raleway" charset="0"/>
+              </a:rPr>
+              <a:t>Examplars</a:t>
+            </a:r>
+            <a:r>
               <a:rPr lang="en-US" sz="3600" dirty="0" smtClean="0">
                 <a:solidFill>
                   <a:schemeClr val="accent6"/>
@@ -5636,7 +5989,40 @@
                 <a:ea typeface="Raleway" charset="0"/>
                 <a:cs typeface="Raleway" charset="0"/>
               </a:rPr>
-              <a:t>Examples that are highly distant from Alpha category members are more likely to be generated. </a:t>
+              <a:t> </a:t>
+            </a:r>
+            <a:r>
+              <a:rPr lang="en-US" sz="3600" dirty="0" smtClean="0">
+                <a:solidFill>
+                  <a:schemeClr val="accent6"/>
+                </a:solidFill>
+                <a:latin typeface="Raleway" charset="0"/>
+                <a:ea typeface="Raleway" charset="0"/>
+                <a:cs typeface="Raleway" charset="0"/>
+              </a:rPr>
+              <a:t>that are highly distant from Alpha category members </a:t>
+            </a:r>
+            <a:r>
+              <a:rPr lang="en-US" sz="3600" dirty="0" smtClean="0">
+                <a:solidFill>
+                  <a:schemeClr val="accent6"/>
+                </a:solidFill>
+                <a:latin typeface="Raleway" charset="0"/>
+                <a:ea typeface="Raleway" charset="0"/>
+                <a:cs typeface="Raleway" charset="0"/>
+              </a:rPr>
+              <a:t>were more </a:t>
+            </a:r>
+            <a:r>
+              <a:rPr lang="en-US" sz="3600" dirty="0" smtClean="0">
+                <a:solidFill>
+                  <a:schemeClr val="accent6"/>
+                </a:solidFill>
+                <a:latin typeface="Raleway" charset="0"/>
+                <a:ea typeface="Raleway" charset="0"/>
+                <a:cs typeface="Raleway" charset="0"/>
+              </a:rPr>
+              <a:t>likely to be generated. </a:t>
             </a:r>
             <a:endParaRPr lang="en-US" sz="3600" dirty="0">
               <a:solidFill>
@@ -7090,7 +7476,7 @@
                 <a:ea typeface="Raleway" charset="0"/>
                 <a:cs typeface="Raleway" charset="0"/>
               </a:rPr>
-              <a:t>Fitted </a:t>
+              <a:t>We fit the </a:t>
             </a:r>
             <a:r>
               <a:rPr lang="en-US" sz="3600" b="1" dirty="0" smtClean="0">
@@ -7156,7 +7542,7 @@
                 <a:ea typeface="Raleway" charset="0"/>
                 <a:cs typeface="Raleway" charset="0"/>
               </a:rPr>
-              <a:t> models, maximizing log-likelihood to every response in our dataset. </a:t>
+              <a:t> models, maximizing log-likelihood to every response in our </a:t>
             </a:r>
             <a:r>
               <a:rPr lang="en-US" sz="3600" dirty="0" smtClean="0">
@@ -7167,8 +7553,60 @@
                 <a:ea typeface="Raleway" charset="0"/>
                 <a:cs typeface="Raleway" charset="0"/>
               </a:rPr>
-              <a:t>PACKER produced an ~11% improvement in log-likelihood.</a:t>
-            </a:r>
+              <a:t>dataset. PACKER’s fit greatly outperformed the other models (~</a:t>
+            </a:r>
+            <a:r>
+              <a:rPr lang="en-US" sz="3600" dirty="0" smtClean="0">
+                <a:solidFill>
+                  <a:schemeClr val="accent6"/>
+                </a:solidFill>
+                <a:latin typeface="Raleway" charset="0"/>
+                <a:ea typeface="Raleway" charset="0"/>
+                <a:cs typeface="Raleway" charset="0"/>
+              </a:rPr>
+              <a:t>11% </a:t>
+            </a:r>
+            <a:r>
+              <a:rPr lang="en-US" sz="3600" dirty="0" smtClean="0">
+                <a:solidFill>
+                  <a:schemeClr val="accent6"/>
+                </a:solidFill>
+                <a:latin typeface="Raleway" charset="0"/>
+                <a:ea typeface="Raleway" charset="0"/>
+                <a:cs typeface="Raleway" charset="0"/>
+              </a:rPr>
+              <a:t>larger </a:t>
+            </a:r>
+            <a:r>
+              <a:rPr lang="en-US" sz="3600" dirty="0" smtClean="0">
+                <a:solidFill>
+                  <a:schemeClr val="accent6"/>
+                </a:solidFill>
+                <a:latin typeface="Raleway" charset="0"/>
+                <a:ea typeface="Raleway" charset="0"/>
+                <a:cs typeface="Raleway" charset="0"/>
+              </a:rPr>
+              <a:t>log-likelihood)</a:t>
+            </a:r>
+            <a:r>
+              <a:rPr lang="en-US" sz="3600" dirty="0" smtClean="0">
+                <a:solidFill>
+                  <a:schemeClr val="accent6"/>
+                </a:solidFill>
+                <a:latin typeface="Raleway" charset="0"/>
+                <a:ea typeface="Raleway" charset="0"/>
+                <a:cs typeface="Raleway" charset="0"/>
+              </a:rPr>
+              <a:t>.</a:t>
+            </a:r>
+            <a:endParaRPr lang="en-US" sz="3600" dirty="0" smtClean="0">
+              <a:solidFill>
+                <a:schemeClr val="accent6"/>
+              </a:solidFill>
+              <a:latin typeface="Raleway" charset="0"/>
+              <a:ea typeface="Raleway" charset="0"/>
+              <a:cs typeface="Raleway" charset="0"/>
+            </a:endParaRPr>
           </a:p>
           <a:p>
             <a:pPr>
@@ -7209,7 +7647,84 @@
                 <a:ea typeface="Raleway" charset="0"/>
                 <a:cs typeface="Raleway" charset="0"/>
               </a:rPr>
-              <a:t>Computed, for each stimulus, the difference between the X- and Y-axis  ranges of each category it was generated in. Categories oriented to increase dissimilarity to the Alpha categories.</a:t>
+              <a:t>We computed</a:t>
+            </a:r>
+            <a:r>
+              <a:rPr lang="en-US" sz="3600" dirty="0" smtClean="0">
+                <a:solidFill>
+                  <a:schemeClr val="accent6"/>
+                </a:solidFill>
+                <a:latin typeface="Raleway" charset="0"/>
+                <a:ea typeface="Raleway" charset="0"/>
+                <a:cs typeface="Raleway" charset="0"/>
+              </a:rPr>
+              <a:t>, for each stimulus, the difference between the X- </a:t>
+            </a:r>
+            <a:r>
+              <a:rPr lang="en-US" sz="3600" smtClean="0">
+                <a:solidFill>
+                  <a:schemeClr val="accent6"/>
+                </a:solidFill>
+                <a:latin typeface="Raleway" charset="0"/>
+                <a:ea typeface="Raleway" charset="0"/>
+                <a:cs typeface="Raleway" charset="0"/>
+              </a:rPr>
+              <a:t>and </a:t>
+            </a:r>
+            <a:r>
+              <a:rPr lang="en-US" sz="3600" smtClean="0">
+                <a:solidFill>
+                  <a:schemeClr val="accent6"/>
+                </a:solidFill>
+                <a:latin typeface="Raleway" charset="0"/>
+                <a:ea typeface="Raleway" charset="0"/>
+                <a:cs typeface="Raleway" charset="0"/>
+              </a:rPr>
+              <a:t>Y-axis </a:t>
+            </a:r>
+            <a:r>
+              <a:rPr lang="en-US" sz="3600" dirty="0" smtClean="0">
+                <a:solidFill>
+                  <a:schemeClr val="accent6"/>
+                </a:solidFill>
+                <a:latin typeface="Raleway" charset="0"/>
+                <a:ea typeface="Raleway" charset="0"/>
+                <a:cs typeface="Raleway" charset="0"/>
+              </a:rPr>
+              <a:t>ranges of each category it was generated in. </a:t>
+            </a:r>
+            <a:r>
+              <a:rPr lang="en-US" sz="3600" smtClean="0">
+                <a:solidFill>
+                  <a:schemeClr val="accent6"/>
+                </a:solidFill>
+                <a:latin typeface="Raleway" charset="0"/>
+                <a:ea typeface="Raleway" charset="0"/>
+                <a:cs typeface="Raleway" charset="0"/>
+              </a:rPr>
+              <a:t>Categories </a:t>
+            </a:r>
+            <a:r>
+              <a:rPr lang="en-US" sz="3600" smtClean="0">
+                <a:solidFill>
+                  <a:schemeClr val="accent6"/>
+                </a:solidFill>
+                <a:latin typeface="Raleway" charset="0"/>
+                <a:ea typeface="Raleway" charset="0"/>
+                <a:cs typeface="Raleway" charset="0"/>
+              </a:rPr>
+              <a:t>were oriented </a:t>
+            </a:r>
+            <a:r>
+              <a:rPr lang="en-US" sz="3600" dirty="0" smtClean="0">
+                <a:solidFill>
+                  <a:schemeClr val="accent6"/>
+                </a:solidFill>
+                <a:latin typeface="Raleway" charset="0"/>
+                <a:ea typeface="Raleway" charset="0"/>
+                <a:cs typeface="Raleway" charset="0"/>
+              </a:rPr>
+              <a:t>to increase dissimilarity to the Alpha categories.</a:t>
             </a:r>
             <a:endParaRPr lang="en-US" sz="4000" dirty="0">
               <a:solidFill>
@@ -8453,18 +8968,7 @@
                 <a:ea typeface="Raleway" charset="0"/>
                 <a:cs typeface="Raleway" charset="0"/>
               </a:rPr>
-              <a:t>Middle participants more likely to create categories spanning the entire Y-axis </a:t>
-            </a:r>
-            <a:r>
-              <a:rPr lang="mr-IN" sz="3600" dirty="0" smtClean="0">
-                <a:solidFill>
-                  <a:schemeClr val="accent6"/>
-                </a:solidFill>
-                <a:latin typeface="Raleway" charset="0"/>
-                <a:ea typeface="Raleway" charset="0"/>
-                <a:cs typeface="Raleway" charset="0"/>
-              </a:rPr>
-              <a:t>–</a:t>
+              <a:t>Middle </a:t>
             </a:r>
             <a:r>
               <a:rPr lang="en-US" sz="3600" dirty="0" smtClean="0">
@@ -8475,6 +8979,41 @@
                 <a:ea typeface="Raleway" charset="0"/>
                 <a:cs typeface="Raleway" charset="0"/>
               </a:rPr>
+              <a:t>Ps were more </a:t>
+            </a:r>
+            <a:r>
+              <a:rPr lang="en-US" sz="3600" dirty="0" smtClean="0">
+                <a:solidFill>
+                  <a:schemeClr val="accent6"/>
+                </a:solidFill>
+                <a:latin typeface="Raleway" charset="0"/>
+                <a:ea typeface="Raleway" charset="0"/>
+                <a:cs typeface="Raleway" charset="0"/>
+              </a:rPr>
+              <a:t>likely to create categories spanning the entire </a:t>
+            </a:r>
+            <a:r>
+              <a:rPr lang="en-US" sz="3600" dirty="0" smtClean="0">
+                <a:solidFill>
+                  <a:schemeClr val="accent6"/>
+                </a:solidFill>
+                <a:latin typeface="Raleway" charset="0"/>
+                <a:ea typeface="Raleway" charset="0"/>
+                <a:cs typeface="Raleway" charset="0"/>
+              </a:rPr>
+              <a:t>Y-axis:</a:t>
+            </a:r>
+          </a:p>
+          <a:p>
+            <a:r>
+              <a:rPr lang="en-US" sz="3600" b="1" dirty="0">
+                <a:solidFill>
+                  <a:schemeClr val="accent6"/>
+                </a:solidFill>
+                <a:latin typeface="Raleway" charset="0"/>
+                <a:ea typeface="Raleway" charset="0"/>
+                <a:cs typeface="Raleway" charset="0"/>
+              </a:rPr>
               <a:t> </a:t>
             </a:r>
             <a:r>
@@ -8486,20 +9025,99 @@
                 <a:ea typeface="Raleway" charset="0"/>
                 <a:cs typeface="Raleway" charset="0"/>
               </a:rPr>
+              <a:t>  </a:t>
+            </a:r>
+            <a:r>
+              <a:rPr lang="en-US" sz="3600" b="1" dirty="0">
+                <a:solidFill>
+                  <a:schemeClr val="accent6"/>
+                </a:solidFill>
+                <a:latin typeface="Raleway" charset="0"/>
+                <a:ea typeface="Raleway" charset="0"/>
+                <a:cs typeface="Raleway" charset="0"/>
+              </a:rPr>
+              <a:t>T</a:t>
+            </a:r>
+            <a:r>
+              <a:rPr lang="en-US" sz="3600" b="1" dirty="0" smtClean="0">
+                <a:solidFill>
+                  <a:schemeClr val="accent6"/>
+                </a:solidFill>
+                <a:latin typeface="Raleway" charset="0"/>
+                <a:ea typeface="Raleway" charset="0"/>
+                <a:cs typeface="Raleway" charset="0"/>
+              </a:rPr>
+              <a:t>he </a:t>
+            </a:r>
+            <a:r>
+              <a:rPr lang="en-US" sz="3600" b="1" i="1" dirty="0" smtClean="0">
+                <a:solidFill>
+                  <a:schemeClr val="accent6"/>
+                </a:solidFill>
+                <a:latin typeface="Raleway" charset="0"/>
+                <a:ea typeface="Raleway" charset="0"/>
+                <a:cs typeface="Raleway" charset="0"/>
+              </a:rPr>
+              <a:t>location </a:t>
+            </a:r>
+            <a:r>
+              <a:rPr lang="en-US" sz="3600" b="1" dirty="0" smtClean="0">
+                <a:solidFill>
+                  <a:schemeClr val="accent6"/>
+                </a:solidFill>
+                <a:latin typeface="Raleway" charset="0"/>
+                <a:ea typeface="Raleway" charset="0"/>
+                <a:cs typeface="Raleway" charset="0"/>
+              </a:rPr>
+              <a:t>of contrast categories </a:t>
+            </a:r>
+            <a:r>
+              <a:rPr lang="en-US" sz="3600" b="1" dirty="0" smtClean="0">
+                <a:solidFill>
+                  <a:schemeClr val="accent6"/>
+                </a:solidFill>
+                <a:latin typeface="Raleway" charset="0"/>
+                <a:ea typeface="Raleway" charset="0"/>
+                <a:cs typeface="Raleway" charset="0"/>
+              </a:rPr>
+              <a:t>influences</a:t>
+            </a:r>
+          </a:p>
+          <a:p>
+            <a:r>
+              <a:rPr lang="en-US" sz="3600" b="1" dirty="0">
+                <a:solidFill>
+                  <a:schemeClr val="accent6"/>
+                </a:solidFill>
+                <a:latin typeface="Raleway" charset="0"/>
+                <a:ea typeface="Raleway" charset="0"/>
+                <a:cs typeface="Raleway" charset="0"/>
+              </a:rPr>
+              <a:t> </a:t>
+            </a:r>
+            <a:r>
+              <a:rPr lang="en-US" sz="3600" b="1" dirty="0" smtClean="0">
+                <a:solidFill>
+                  <a:schemeClr val="accent6"/>
+                </a:solidFill>
+                <a:latin typeface="Raleway" charset="0"/>
+                <a:ea typeface="Raleway" charset="0"/>
+                <a:cs typeface="Raleway" charset="0"/>
+              </a:rPr>
+              <a:t>      </a:t>
+            </a:r>
+            <a:r>
+              <a:rPr lang="en-US" sz="3600" b="1" dirty="0" smtClean="0">
+                <a:solidFill>
+                  <a:schemeClr val="accent6"/>
+                </a:solidFill>
+                <a:latin typeface="Raleway" charset="0"/>
+                <a:ea typeface="Raleway" charset="0"/>
+                <a:cs typeface="Raleway" charset="0"/>
+              </a:rPr>
               <a:t>the </a:t>
             </a:r>
             <a:r>
-              <a:rPr lang="en-US" sz="3600" b="1" i="1" dirty="0" smtClean="0">
-                <a:solidFill>
-                  <a:schemeClr val="accent6"/>
-                </a:solidFill>
-                <a:latin typeface="Raleway" charset="0"/>
-                <a:ea typeface="Raleway" charset="0"/>
-                <a:cs typeface="Raleway" charset="0"/>
-              </a:rPr>
-              <a:t>location </a:t>
-            </a:r>
-            <a:r>
               <a:rPr lang="en-US" sz="3600" b="1" dirty="0" smtClean="0">
                 <a:solidFill>
                   <a:schemeClr val="accent6"/>
@@ -8508,7 +9126,7 @@
                 <a:ea typeface="Raleway" charset="0"/>
                 <a:cs typeface="Raleway" charset="0"/>
               </a:rPr>
-              <a:t>of contrast categories influences the distribution of generated categories.</a:t>
+              <a:t>distribution of generated categories.</a:t>
             </a:r>
             <a:endParaRPr lang="en-US" sz="3600" b="1" i="1" dirty="0" smtClean="0">
               <a:solidFill>
@@ -8579,14 +9197,6 @@
               </a:rPr>
               <a:t>Generated category members were more similar to each other than to Alphas..</a:t>
             </a:r>
-            <a:endParaRPr lang="en-US" sz="3600" dirty="0" smtClean="0">
-              <a:solidFill>
-                <a:schemeClr val="accent6"/>
-              </a:solidFill>
-              <a:latin typeface="Raleway" charset="0"/>
-              <a:ea typeface="Raleway" charset="0"/>
-              <a:cs typeface="Raleway" charset="0"/>
-            </a:endParaRPr>
           </a:p>
         </p:txBody>
       </p:sp>
@@ -8638,7 +9248,7 @@
           <a:p>
             <a:pPr marL="350838" indent="-350838"/>
             <a:r>
-              <a:rPr lang="en-US" sz="2400" smtClean="0">
+              <a:rPr lang="en-US" sz="2400" dirty="0" err="1" smtClean="0">
                 <a:solidFill>
                   <a:schemeClr val="accent6"/>
                 </a:solidFill>
@@ -8651,7 +9261,39 @@
                   <a:schemeClr val="accent6"/>
                 </a:solidFill>
               </a:rPr>
-              <a:t>, A., &amp; Kemp, C. (2013). A probabilistic account of exemplar and category generation. Cognitive Psychology, 66(1), 85–125</a:t>
+              <a:t>, A., &amp; Kemp, C. (2013). A probabilistic account of exemplar and category generation. </a:t>
+            </a:r>
+            <a:r>
+              <a:rPr lang="en-US" sz="2400" i="1" dirty="0">
+                <a:solidFill>
+                  <a:schemeClr val="accent6"/>
+                </a:solidFill>
+              </a:rPr>
+              <a:t>Cognitive Psychology</a:t>
+            </a:r>
+            <a:r>
+              <a:rPr lang="en-US" sz="2400" dirty="0">
+                <a:solidFill>
+                  <a:schemeClr val="accent6"/>
+                </a:solidFill>
+              </a:rPr>
+              <a:t>, </a:t>
+            </a:r>
+            <a:r>
+              <a:rPr lang="en-US" sz="2400" i="1" dirty="0">
+                <a:solidFill>
+                  <a:schemeClr val="accent6"/>
+                </a:solidFill>
+              </a:rPr>
+              <a:t>66</a:t>
+            </a:r>
+            <a:r>
+              <a:rPr lang="en-US" sz="2400" dirty="0">
+                <a:solidFill>
+                  <a:schemeClr val="accent6"/>
+                </a:solidFill>
+              </a:rPr>
+              <a:t>(1), 85–125</a:t>
             </a:r>
             <a:r>
               <a:rPr lang="en-US" sz="2400" dirty="0" smtClean="0">
@@ -8694,7 +9336,39 @@
                   <a:schemeClr val="accent6"/>
                 </a:solidFill>
               </a:rPr>
-              <a:t>(1984). Choice, similarity, and the context theory of classification. J</a:t>
+              <a:t>(1984). Choice, similarity, and the context theory of classification. </a:t>
+            </a:r>
+            <a:r>
+              <a:rPr lang="en-US" sz="2400" i="1" dirty="0">
+                <a:solidFill>
+                  <a:schemeClr val="accent6"/>
+                </a:solidFill>
+              </a:rPr>
+              <a:t>J</a:t>
+            </a:r>
+            <a:r>
+              <a:rPr lang="en-US" sz="2400" i="1" dirty="0" smtClean="0">
+                <a:solidFill>
+                  <a:schemeClr val="accent6"/>
+                </a:solidFill>
+              </a:rPr>
+              <a:t>EP:LMC, </a:t>
+            </a:r>
+            <a:r>
+              <a:rPr lang="en-US" sz="2400" i="1" dirty="0">
+                <a:solidFill>
+                  <a:schemeClr val="accent6"/>
+                </a:solidFill>
+              </a:rPr>
+              <a:t>10(</a:t>
+            </a:r>
+            <a:r>
+              <a:rPr lang="en-US" sz="2400" dirty="0">
+                <a:solidFill>
+                  <a:schemeClr val="accent6"/>
+                </a:solidFill>
+              </a:rPr>
+              <a:t>1), 104</a:t>
             </a:r>
             <a:r>
               <a:rPr lang="en-US" sz="2400" dirty="0" smtClean="0">
@@ -8702,7 +9376,18 @@
                   <a:schemeClr val="accent6"/>
                 </a:solidFill>
               </a:rPr>
-              <a:t>EP:LMC, </a:t>
+              <a:t>.</a:t>
+            </a:r>
+          </a:p>
+          <a:p>
+            <a:pPr marL="350838" indent="-350838"/>
+            <a:r>
+              <a:rPr lang="en-US" sz="2400" dirty="0" smtClean="0">
+                <a:solidFill>
+                  <a:schemeClr val="accent6"/>
+                </a:solidFill>
+              </a:rPr>
+              <a:t>Ward</a:t>
             </a:r>
             <a:r>
               <a:rPr lang="en-US" sz="2400" dirty="0">
@@ -8710,7 +9395,7 @@
                   <a:schemeClr val="accent6"/>
                 </a:solidFill>
               </a:rPr>
-              <a:t>10(1), 104</a:t>
+              <a:t>, T</a:t>
             </a:r>
             <a:r>
               <a:rPr lang="en-US" sz="2400" dirty="0" smtClean="0">
@@ -8718,6 +9403,54 @@
                   <a:schemeClr val="accent6"/>
                 </a:solidFill>
               </a:rPr>
+              <a:t>. </a:t>
+            </a:r>
+            <a:r>
+              <a:rPr lang="en-US" sz="2400" dirty="0">
+                <a:solidFill>
+                  <a:schemeClr val="accent6"/>
+                </a:solidFill>
+              </a:rPr>
+              <a:t>(1994). Structured imagination: The role of category structure in exemplar generation. </a:t>
+            </a:r>
+            <a:r>
+              <a:rPr lang="en-US" sz="2400" i="1" dirty="0">
+                <a:solidFill>
+                  <a:schemeClr val="accent6"/>
+                </a:solidFill>
+              </a:rPr>
+              <a:t>Cognitive Psychology</a:t>
+            </a:r>
+            <a:r>
+              <a:rPr lang="en-US" sz="2400" dirty="0">
+                <a:solidFill>
+                  <a:schemeClr val="accent6"/>
+                </a:solidFill>
+              </a:rPr>
+              <a:t>, </a:t>
+            </a:r>
+            <a:r>
+              <a:rPr lang="en-US" sz="2400" i="1" dirty="0">
+                <a:solidFill>
+                  <a:schemeClr val="accent6"/>
+                </a:solidFill>
+              </a:rPr>
+              <a:t>27</a:t>
+            </a:r>
+            <a:r>
+              <a:rPr lang="en-US" sz="2400" dirty="0">
+                <a:solidFill>
+                  <a:schemeClr val="accent6"/>
+                </a:solidFill>
+              </a:rPr>
+              <a:t>(1), 1–40</a:t>
+            </a:r>
+            <a:r>
+              <a:rPr lang="en-US" sz="2400" dirty="0" smtClean="0">
+                <a:solidFill>
+                  <a:schemeClr val="accent6"/>
+                </a:solidFill>
+              </a:rPr>
               <a:t>.</a:t>
             </a:r>
           </a:p>
@@ -8753,7 +9486,7 @@
                   <a:schemeClr val="accent6"/>
                 </a:solidFill>
               </a:rPr>
-              <a:t>(1994). Structured imagination: The role of category structure in exemplar generation. Cognitive Psychology, 27(1), 1–40</a:t>
+              <a:t>(1995). </a:t>
             </a:r>
             <a:r>
               <a:rPr lang="en-US" sz="2400" dirty="0" smtClean="0">
@@ -8761,26 +9494,39 @@
                   <a:schemeClr val="accent6"/>
                 </a:solidFill>
               </a:rPr>
-              <a:t>.</a:t>
-            </a:r>
-          </a:p>
-          <a:p>
-            <a:pPr marL="350838" indent="-350838"/>
+              <a:t>What’s </a:t>
+            </a:r>
+            <a:r>
+              <a:rPr lang="en-US" sz="2400" dirty="0">
+                <a:solidFill>
+                  <a:schemeClr val="accent6"/>
+                </a:solidFill>
+              </a:rPr>
+              <a:t>old about new ideas</a:t>
+            </a:r>
             <a:r>
               <a:rPr lang="en-US" sz="2400" dirty="0" smtClean="0">
                 <a:solidFill>
                   <a:schemeClr val="accent6"/>
                 </a:solidFill>
               </a:rPr>
-              <a:t>Ward</a:t>
-            </a:r>
-            <a:r>
-              <a:rPr lang="en-US" sz="2400" dirty="0">
-                <a:solidFill>
-                  <a:schemeClr val="accent6"/>
-                </a:solidFill>
-              </a:rPr>
-              <a:t>, T</a:t>
+              <a:t>. In </a:t>
+            </a:r>
+            <a:r>
+              <a:rPr lang="en-US" sz="2400" i="1" dirty="0">
+                <a:solidFill>
+                  <a:schemeClr val="accent6"/>
+                </a:solidFill>
+              </a:rPr>
+              <a:t>The creative cognition </a:t>
+            </a:r>
+            <a:r>
+              <a:rPr lang="en-US" sz="2400" i="1" dirty="0" smtClean="0">
+                <a:solidFill>
+                  <a:schemeClr val="accent6"/>
+                </a:solidFill>
+              </a:rPr>
+              <a:t>approach</a:t>
             </a:r>
             <a:r>
               <a:rPr lang="en-US" sz="2400" dirty="0" smtClean="0">
@@ -8788,31 +9534,7 @@
                   <a:schemeClr val="accent6"/>
                 </a:solidFill>
               </a:rPr>
-              <a:t>. </a:t>
-            </a:r>
-            <a:r>
-              <a:rPr lang="en-US" sz="2400" dirty="0">
-                <a:solidFill>
-                  <a:schemeClr val="accent6"/>
-                </a:solidFill>
-              </a:rPr>
-              <a:t>(1995). </a:t>
-            </a:r>
-            <a:r>
-              <a:rPr lang="en-US" sz="2400" dirty="0" smtClean="0">
-                <a:solidFill>
-                  <a:schemeClr val="accent6"/>
-                </a:solidFill>
-              </a:rPr>
-              <a:t>What’s </a:t>
-            </a:r>
-            <a:r>
-              <a:rPr lang="en-US" sz="2400" dirty="0">
-                <a:solidFill>
-                  <a:schemeClr val="accent6"/>
-                </a:solidFill>
-              </a:rPr>
-              <a:t>old about new ideas. The creative cognition approach, 157–178.</a:t>
+              <a:t> (pp. 157–178).</a:t>
             </a:r>
             <a:endParaRPr lang="en-US" sz="2400" dirty="0">
               <a:solidFill>
@@ -8905,17 +9627,6 @@
               <a:t>Questions: </a:t>
             </a:r>
             <a:r>
-              <a:rPr lang="en-US" sz="3600" dirty="0">
-                <a:solidFill>
-                  <a:schemeClr val="accent6"/>
-                </a:solidFill>
-                <a:latin typeface="Raleway" charset="0"/>
-                <a:ea typeface="Raleway" charset="0"/>
-                <a:cs typeface="Raleway" charset="0"/>
-              </a:rPr>
-              <a:t>D</a:t>
-            </a:r>
-            <a:r>
               <a:rPr lang="en-US" sz="3600" dirty="0" smtClean="0">
                 <a:solidFill>
                   <a:schemeClr val="accent6"/>
@@ -8924,18 +9635,7 @@
                 <a:ea typeface="Raleway" charset="0"/>
                 <a:cs typeface="Raleway" charset="0"/>
               </a:rPr>
-              <a:t>o </a:t>
-            </a:r>
-            <a:r>
-              <a:rPr lang="en-US" sz="3600" dirty="0">
-                <a:solidFill>
-                  <a:schemeClr val="accent6"/>
-                </a:solidFill>
-                <a:latin typeface="Raleway" charset="0"/>
-                <a:ea typeface="Raleway" charset="0"/>
-                <a:cs typeface="Raleway" charset="0"/>
-              </a:rPr>
-              <a:t>generated categories contrast with previously learned categories</a:t>
+              <a:t>Does contrast with a previously learned category influence category generation? </a:t>
             </a:r>
             <a:r>
               <a:rPr lang="en-US" sz="3600" dirty="0" smtClean="0">
@@ -8946,7 +9646,18 @@
                 <a:ea typeface="Raleway" charset="0"/>
                 <a:cs typeface="Raleway" charset="0"/>
               </a:rPr>
-              <a:t>? Is distributional emulation the only factor?</a:t>
+              <a:t>Is </a:t>
+            </a:r>
+            <a:r>
+              <a:rPr lang="en-US" sz="3600" dirty="0" smtClean="0">
+                <a:solidFill>
+                  <a:schemeClr val="accent6"/>
+                </a:solidFill>
+                <a:latin typeface="Raleway" charset="0"/>
+                <a:ea typeface="Raleway" charset="0"/>
+                <a:cs typeface="Raleway" charset="0"/>
+              </a:rPr>
+              <a:t>distributional emulation the only factor?</a:t>
             </a:r>
           </a:p>
           <a:p>
@@ -8959,6 +9670,17 @@
               </a:spcAft>
             </a:pPr>
             <a:r>
+              <a:rPr lang="en-US" sz="3600" b="1" dirty="0" smtClean="0">
+                <a:solidFill>
+                  <a:schemeClr val="accent6"/>
+                </a:solidFill>
+                <a:latin typeface="Raleway" charset="0"/>
+                <a:ea typeface="Raleway" charset="0"/>
+                <a:cs typeface="Raleway" charset="0"/>
+              </a:rPr>
+              <a:t>Participants</a:t>
+            </a:r>
+            <a:r>
               <a:rPr lang="en-US" sz="3600" dirty="0" smtClean="0">
                 <a:solidFill>
                   <a:schemeClr val="accent6"/>
@@ -8967,7 +9689,7 @@
                 <a:ea typeface="Raleway" charset="0"/>
                 <a:cs typeface="Raleway" charset="0"/>
               </a:rPr>
-              <a:t>Participants (N=122) learned about an experimenter-defined category (‘Alpha’) composed of squares varying in size and color</a:t>
+              <a:t> </a:t>
             </a:r>
             <a:r>
               <a:rPr lang="en-US" sz="3600" dirty="0" smtClean="0">
@@ -8978,7 +9700,40 @@
                 <a:ea typeface="Raleway" charset="0"/>
                 <a:cs typeface="Raleway" charset="0"/>
               </a:rPr>
-              <a:t>.</a:t>
+              <a:t>(</a:t>
+            </a:r>
+            <a:r>
+              <a:rPr lang="en-US" sz="3600" dirty="0" err="1" smtClean="0">
+                <a:solidFill>
+                  <a:schemeClr val="accent6"/>
+                </a:solidFill>
+                <a:latin typeface="Raleway" charset="0"/>
+                <a:ea typeface="Raleway" charset="0"/>
+                <a:cs typeface="Raleway" charset="0"/>
+              </a:rPr>
+              <a:t>MTurk</a:t>
+            </a:r>
+            <a:r>
+              <a:rPr lang="en-US" sz="3600" dirty="0" smtClean="0">
+                <a:solidFill>
+                  <a:schemeClr val="accent6"/>
+                </a:solidFill>
+                <a:latin typeface="Raleway" charset="0"/>
+                <a:ea typeface="Raleway" charset="0"/>
+                <a:cs typeface="Raleway" charset="0"/>
+              </a:rPr>
+              <a:t>; N=122</a:t>
+            </a:r>
+            <a:r>
+              <a:rPr lang="en-US" sz="3600" dirty="0" smtClean="0">
+                <a:solidFill>
+                  <a:schemeClr val="accent6"/>
+                </a:solidFill>
+                <a:latin typeface="Raleway" charset="0"/>
+                <a:ea typeface="Raleway" charset="0"/>
+                <a:cs typeface="Raleway" charset="0"/>
+              </a:rPr>
+              <a:t>) learned about an experimenter-defined category (‘Alpha’) composed of squares varying in size and color.</a:t>
             </a:r>
           </a:p>
           <a:p>
@@ -9246,7 +10001,18 @@
                 <a:ea typeface="Raleway" charset="0"/>
                 <a:cs typeface="Raleway" charset="0"/>
               </a:rPr>
-              <a:t>Participants should generate items distant from the Alphas.</a:t>
+              <a:t>All Ps </a:t>
+            </a:r>
+            <a:r>
+              <a:rPr lang="en-US" sz="3600" dirty="0" smtClean="0">
+                <a:solidFill>
+                  <a:schemeClr val="accent6"/>
+                </a:solidFill>
+                <a:latin typeface="Raleway" charset="0"/>
+                <a:ea typeface="Raleway" charset="0"/>
+                <a:cs typeface="Raleway" charset="0"/>
+              </a:rPr>
+              <a:t>should generate items distant from the Alphas.</a:t>
             </a:r>
           </a:p>
           <a:p>
@@ -9272,17 +10038,6 @@
               <a:t>Middle </a:t>
             </a:r>
             <a:r>
-              <a:rPr lang="en-US" sz="3600" dirty="0" err="1" smtClean="0">
-                <a:solidFill>
-                  <a:schemeClr val="accent6"/>
-                </a:solidFill>
-                <a:latin typeface="Raleway" charset="0"/>
-                <a:ea typeface="Raleway" charset="0"/>
-                <a:cs typeface="Raleway" charset="0"/>
-              </a:rPr>
-              <a:t>Ss</a:t>
-            </a:r>
-            <a:r>
               <a:rPr lang="en-US" sz="3600" dirty="0" smtClean="0">
                 <a:solidFill>
                   <a:schemeClr val="accent6"/>
@@ -9291,16 +10046,19 @@
                 <a:ea typeface="Raleway" charset="0"/>
                 <a:cs typeface="Raleway" charset="0"/>
               </a:rPr>
-              <a:t> should create categories spanning the entire Y-axis.</a:t>
-            </a:r>
-            <a:endParaRPr lang="en-US" sz="3600" dirty="0" smtClean="0">
-              <a:solidFill>
-                <a:schemeClr val="accent6"/>
-              </a:solidFill>
-              <a:latin typeface="Raleway" charset="0"/>
-              <a:ea typeface="Raleway" charset="0"/>
-              <a:cs typeface="Raleway" charset="0"/>
-            </a:endParaRPr>
+              <a:t>Ps </a:t>
+            </a:r>
+            <a:r>
+              <a:rPr lang="en-US" sz="3600" dirty="0" smtClean="0">
+                <a:solidFill>
+                  <a:schemeClr val="accent6"/>
+                </a:solidFill>
+                <a:latin typeface="Raleway" charset="0"/>
+                <a:ea typeface="Raleway" charset="0"/>
+                <a:cs typeface="Raleway" charset="0"/>
+              </a:rPr>
+              <a:t>should create categories spanning the entire Y-axis.</a:t>
+            </a:r>
           </a:p>
           <a:p>
             <a:pPr>
@@ -9416,6 +10174,13 @@
   <p:clrMapOvr>
     <a:masterClrMapping/>
   </p:clrMapOvr>
+  <p:timing>
+    <p:tnLst>
+      <p:par>
+        <p:cTn id="1" dur="indefinite" restart="never" nodeType="tmRoot"/>
+      </p:par>
+    </p:tnLst>
+  </p:timing>
 </p:sld>
 </file>
 

</xml_diff>

<commit_message>
minor edits to 2017 cogsci poster
</commit_message>
<xml_diff>
--- a/Presentations/cogsci-2017-poster.pptx
+++ b/Presentations/cogsci-2017-poster.pptx
@@ -228,7 +228,7 @@
           <a:p>
             <a:fld id="{CDC9373C-994F-E447-87BC-0883031F8899}" type="datetimeFigureOut">
               <a:rPr lang="en-US" smtClean="0"/>
-              <a:t>7/7/17</a:t>
+              <a:t>7/9/17</a:t>
             </a:fld>
             <a:endParaRPr lang="en-US"/>
           </a:p>
@@ -736,7 +736,7 @@
           <a:p>
             <a:fld id="{BE537D98-B3AD-A54B-94FE-0511E43D51EA}" type="datetimeFigureOut">
               <a:rPr lang="en-US" smtClean="0"/>
-              <a:t>7/7/17</a:t>
+              <a:t>7/9/17</a:t>
             </a:fld>
             <a:endParaRPr lang="en-US"/>
           </a:p>
@@ -901,7 +901,7 @@
           <a:p>
             <a:fld id="{BE537D98-B3AD-A54B-94FE-0511E43D51EA}" type="datetimeFigureOut">
               <a:rPr lang="en-US" smtClean="0"/>
-              <a:t>7/7/17</a:t>
+              <a:t>7/9/17</a:t>
             </a:fld>
             <a:endParaRPr lang="en-US"/>
           </a:p>
@@ -1076,7 +1076,7 @@
           <a:p>
             <a:fld id="{BE537D98-B3AD-A54B-94FE-0511E43D51EA}" type="datetimeFigureOut">
               <a:rPr lang="en-US" smtClean="0"/>
-              <a:t>7/7/17</a:t>
+              <a:t>7/9/17</a:t>
             </a:fld>
             <a:endParaRPr lang="en-US"/>
           </a:p>
@@ -1241,7 +1241,7 @@
           <a:p>
             <a:fld id="{BE537D98-B3AD-A54B-94FE-0511E43D51EA}" type="datetimeFigureOut">
               <a:rPr lang="en-US" smtClean="0"/>
-              <a:t>7/7/17</a:t>
+              <a:t>7/9/17</a:t>
             </a:fld>
             <a:endParaRPr lang="en-US"/>
           </a:p>
@@ -1480,7 +1480,7 @@
           <a:p>
             <a:fld id="{BE537D98-B3AD-A54B-94FE-0511E43D51EA}" type="datetimeFigureOut">
               <a:rPr lang="en-US" smtClean="0"/>
-              <a:t>7/7/17</a:t>
+              <a:t>7/9/17</a:t>
             </a:fld>
             <a:endParaRPr lang="en-US"/>
           </a:p>
@@ -1707,7 +1707,7 @@
           <a:p>
             <a:fld id="{BE537D98-B3AD-A54B-94FE-0511E43D51EA}" type="datetimeFigureOut">
               <a:rPr lang="en-US" smtClean="0"/>
-              <a:t>7/7/17</a:t>
+              <a:t>7/9/17</a:t>
             </a:fld>
             <a:endParaRPr lang="en-US"/>
           </a:p>
@@ -2069,7 +2069,7 @@
           <a:p>
             <a:fld id="{BE537D98-B3AD-A54B-94FE-0511E43D51EA}" type="datetimeFigureOut">
               <a:rPr lang="en-US" smtClean="0"/>
-              <a:t>7/7/17</a:t>
+              <a:t>7/9/17</a:t>
             </a:fld>
             <a:endParaRPr lang="en-US"/>
           </a:p>
@@ -2182,7 +2182,7 @@
           <a:p>
             <a:fld id="{BE537D98-B3AD-A54B-94FE-0511E43D51EA}" type="datetimeFigureOut">
               <a:rPr lang="en-US" smtClean="0"/>
-              <a:t>7/7/17</a:t>
+              <a:t>7/9/17</a:t>
             </a:fld>
             <a:endParaRPr lang="en-US"/>
           </a:p>
@@ -2272,7 +2272,7 @@
           <a:p>
             <a:fld id="{BE537D98-B3AD-A54B-94FE-0511E43D51EA}" type="datetimeFigureOut">
               <a:rPr lang="en-US" smtClean="0"/>
-              <a:t>7/7/17</a:t>
+              <a:t>7/9/17</a:t>
             </a:fld>
             <a:endParaRPr lang="en-US"/>
           </a:p>
@@ -2544,7 +2544,7 @@
           <a:p>
             <a:fld id="{BE537D98-B3AD-A54B-94FE-0511E43D51EA}" type="datetimeFigureOut">
               <a:rPr lang="en-US" smtClean="0"/>
-              <a:t>7/7/17</a:t>
+              <a:t>7/9/17</a:t>
             </a:fld>
             <a:endParaRPr lang="en-US"/>
           </a:p>
@@ -2796,7 +2796,7 @@
           <a:p>
             <a:fld id="{BE537D98-B3AD-A54B-94FE-0511E43D51EA}" type="datetimeFigureOut">
               <a:rPr lang="en-US" smtClean="0"/>
-              <a:t>7/7/17</a:t>
+              <a:t>7/9/17</a:t>
             </a:fld>
             <a:endParaRPr lang="en-US"/>
           </a:p>
@@ -3007,7 +3007,7 @@
           <a:p>
             <a:fld id="{BE537D98-B3AD-A54B-94FE-0511E43D51EA}" type="datetimeFigureOut">
               <a:rPr lang="en-US" smtClean="0"/>
-              <a:t>7/7/17</a:t>
+              <a:t>7/9/17</a:t>
             </a:fld>
             <a:endParaRPr lang="en-US"/>
           </a:p>
@@ -3779,18 +3779,7 @@
                 <a:ea typeface="Raleway" charset="0"/>
                 <a:cs typeface="Raleway" charset="0"/>
               </a:rPr>
-              <a:t>Ps draw </a:t>
-            </a:r>
-            <a:r>
-              <a:rPr lang="en-US" sz="3600" dirty="0" smtClean="0">
-                <a:solidFill>
-                  <a:schemeClr val="accent6"/>
-                </a:solidFill>
-                <a:latin typeface="Raleway" charset="0"/>
-                <a:ea typeface="Raleway" charset="0"/>
-                <a:cs typeface="Raleway" charset="0"/>
-              </a:rPr>
-              <a:t>pictures of new </a:t>
+              <a:t>Ps draw pictures of new </a:t>
             </a:r>
             <a:r>
               <a:rPr lang="en-US" sz="3600" dirty="0">
@@ -4083,38 +4072,8 @@
                 <a:ea typeface="Raleway" charset="0"/>
                 <a:cs typeface="Raleway" charset="0"/>
               </a:rPr>
-              <a:t>Existing Accounts (Jern &amp; Kemp, 2013; Ward, </a:t>
-            </a:r>
-            <a:r>
-              <a:rPr lang="en-US" sz="3600" b="1" dirty="0" smtClean="0">
-                <a:solidFill>
-                  <a:schemeClr val="accent6"/>
-                </a:solidFill>
-                <a:latin typeface="Raleway" charset="0"/>
-                <a:ea typeface="Raleway" charset="0"/>
-                <a:cs typeface="Raleway" charset="0"/>
-              </a:rPr>
-              <a:t>199</a:t>
-            </a:r>
-            <a:r>
-              <a:rPr lang="en-US" sz="3600" b="1" dirty="0" smtClean="0">
-                <a:solidFill>
-                  <a:schemeClr val="accent6"/>
-                </a:solidFill>
-                <a:latin typeface="Raleway" charset="0"/>
-                <a:ea typeface="Raleway" charset="0"/>
-                <a:cs typeface="Raleway" charset="0"/>
-              </a:rPr>
-              <a:t>5)</a:t>
-            </a:r>
-            <a:endParaRPr lang="en-US" sz="3600" b="1" dirty="0" smtClean="0">
-              <a:solidFill>
-                <a:schemeClr val="accent6"/>
-              </a:solidFill>
-              <a:latin typeface="Raleway" charset="0"/>
-              <a:ea typeface="Raleway" charset="0"/>
-              <a:cs typeface="Raleway" charset="0"/>
-            </a:endParaRPr>
+              <a:t>Existing Accounts (Jern &amp; Kemp, 2013; Ward, 1995)</a:t>
+            </a:r>
           </a:p>
           <a:p>
             <a:pPr marL="403225" indent="-284163">
@@ -4323,27 +4282,8 @@
                 <a:ea typeface="Raleway" charset="0"/>
                 <a:cs typeface="Raleway" charset="0"/>
               </a:rPr>
-              <a:t>. New concepts should be </a:t>
-            </a:r>
-            <a:r>
-              <a:rPr lang="en-US" sz="3600" dirty="0" smtClean="0">
-                <a:solidFill>
-                  <a:schemeClr val="accent6"/>
-                </a:solidFill>
-                <a:latin typeface="Raleway" charset="0"/>
-                <a:ea typeface="Raleway" charset="0"/>
-                <a:cs typeface="Raleway" charset="0"/>
-              </a:rPr>
-              <a:t>distinct from known ones.</a:t>
-            </a:r>
-            <a:endParaRPr lang="en-US" sz="3600" dirty="0" smtClean="0">
-              <a:solidFill>
-                <a:schemeClr val="accent6"/>
-              </a:solidFill>
-              <a:latin typeface="Raleway" charset="0"/>
-              <a:ea typeface="Raleway" charset="0"/>
-              <a:cs typeface="Raleway" charset="0"/>
-            </a:endParaRPr>
+              <a:t>. New concepts should be distinct from known ones.</a:t>
+            </a:r>
           </a:p>
           <a:p>
             <a:pPr>
@@ -4363,27 +4303,8 @@
                 <a:ea typeface="Raleway" charset="0"/>
                 <a:cs typeface="Raleway" charset="0"/>
               </a:rPr>
-              <a:t>How do people ensure their creations are unique</a:t>
-            </a:r>
-            <a:r>
-              <a:rPr lang="en-US" sz="3600" i="1" dirty="0" smtClean="0">
-                <a:solidFill>
-                  <a:schemeClr val="accent6"/>
-                </a:solidFill>
-                <a:latin typeface="Raleway" charset="0"/>
-                <a:ea typeface="Raleway" charset="0"/>
-                <a:cs typeface="Raleway" charset="0"/>
-              </a:rPr>
-              <a:t>?</a:t>
-            </a:r>
-            <a:endParaRPr lang="en-US" sz="3600" i="1" dirty="0" smtClean="0">
-              <a:solidFill>
-                <a:schemeClr val="accent6"/>
-              </a:solidFill>
-              <a:latin typeface="Raleway" charset="0"/>
-              <a:ea typeface="Raleway" charset="0"/>
-              <a:cs typeface="Raleway" charset="0"/>
-            </a:endParaRPr>
+              <a:t>How do people ensure their creations are unique?</a:t>
+            </a:r>
           </a:p>
           <a:p>
             <a:pPr>
@@ -4426,29 +4347,7 @@
                 <a:ea typeface="Raleway" charset="0"/>
                 <a:cs typeface="Raleway" charset="0"/>
               </a:rPr>
-              <a:t>Proposed contrast as a core principle of </a:t>
-            </a:r>
-            <a:r>
-              <a:rPr lang="en-US" sz="3600" dirty="0" smtClean="0">
-                <a:solidFill>
-                  <a:schemeClr val="accent6"/>
-                </a:solidFill>
-                <a:latin typeface="Raleway" charset="0"/>
-                <a:ea typeface="Raleway" charset="0"/>
-                <a:cs typeface="Raleway" charset="0"/>
-              </a:rPr>
-              <a:t>generation</a:t>
-            </a:r>
-            <a:r>
-              <a:rPr lang="en-US" sz="3600" dirty="0" smtClean="0">
-                <a:solidFill>
-                  <a:schemeClr val="accent6"/>
-                </a:solidFill>
-                <a:latin typeface="Raleway" charset="0"/>
-                <a:ea typeface="Raleway" charset="0"/>
-                <a:cs typeface="Raleway" charset="0"/>
-              </a:rPr>
-              <a:t>.</a:t>
+              <a:t>Proposed contrast as a core principle of generation.</a:t>
             </a:r>
           </a:p>
           <a:p>
@@ -4471,84 +4370,7 @@
                 <a:ea typeface="Raleway" charset="0"/>
                 <a:cs typeface="Raleway" charset="0"/>
               </a:rPr>
-              <a:t>Developed an exemplar-based model </a:t>
-            </a:r>
-            <a:r>
-              <a:rPr lang="en-US" sz="3600" dirty="0" smtClean="0">
-                <a:solidFill>
-                  <a:schemeClr val="accent6"/>
-                </a:solidFill>
-                <a:latin typeface="Raleway" charset="0"/>
-                <a:ea typeface="Raleway" charset="0"/>
-                <a:cs typeface="Raleway" charset="0"/>
-              </a:rPr>
-              <a:t>including </a:t>
-            </a:r>
-            <a:r>
-              <a:rPr lang="en-US" sz="3600" dirty="0" smtClean="0">
-                <a:solidFill>
-                  <a:schemeClr val="accent6"/>
-                </a:solidFill>
-                <a:latin typeface="Raleway" charset="0"/>
-                <a:ea typeface="Raleway" charset="0"/>
-                <a:cs typeface="Raleway" charset="0"/>
-              </a:rPr>
-              <a:t>contrast </a:t>
-            </a:r>
-            <a:r>
-              <a:rPr lang="en-US" sz="3600" dirty="0" smtClean="0">
-                <a:solidFill>
-                  <a:schemeClr val="accent6"/>
-                </a:solidFill>
-                <a:latin typeface="Raleway" charset="0"/>
-                <a:ea typeface="Raleway" charset="0"/>
-                <a:cs typeface="Raleway" charset="0"/>
-              </a:rPr>
-              <a:t>as a </a:t>
-            </a:r>
-            <a:r>
-              <a:rPr lang="en-US" sz="3600" dirty="0" smtClean="0">
-                <a:solidFill>
-                  <a:schemeClr val="accent6"/>
-                </a:solidFill>
-                <a:latin typeface="Raleway" charset="0"/>
-                <a:ea typeface="Raleway" charset="0"/>
-                <a:cs typeface="Raleway" charset="0"/>
-              </a:rPr>
-              <a:t>mechanism </a:t>
-            </a:r>
-            <a:r>
-              <a:rPr lang="en-US" sz="3600" dirty="0" smtClean="0">
-                <a:solidFill>
-                  <a:schemeClr val="accent6"/>
-                </a:solidFill>
-                <a:latin typeface="Raleway" charset="0"/>
-                <a:ea typeface="Raleway" charset="0"/>
-                <a:cs typeface="Raleway" charset="0"/>
-              </a:rPr>
-              <a:t>for generating </a:t>
-            </a:r>
-            <a:r>
-              <a:rPr lang="en-US" sz="3600" dirty="0" smtClean="0">
-                <a:solidFill>
-                  <a:schemeClr val="accent6"/>
-                </a:solidFill>
-                <a:latin typeface="Raleway" charset="0"/>
-                <a:ea typeface="Raleway" charset="0"/>
-                <a:cs typeface="Raleway" charset="0"/>
-              </a:rPr>
-              <a:t>categories</a:t>
-            </a:r>
-            <a:r>
-              <a:rPr lang="en-US" sz="3600" dirty="0" smtClean="0">
-                <a:solidFill>
-                  <a:schemeClr val="accent6"/>
-                </a:solidFill>
-                <a:latin typeface="Raleway" charset="0"/>
-                <a:ea typeface="Raleway" charset="0"/>
-                <a:cs typeface="Raleway" charset="0"/>
-              </a:rPr>
-              <a:t>.</a:t>
+              <a:t>Developed an exemplar-based model including contrast as a mechanism for generating categories.</a:t>
             </a:r>
           </a:p>
           <a:p>
@@ -4571,7 +4393,7 @@
                 <a:ea typeface="Raleway" charset="0"/>
                 <a:cs typeface="Raleway" charset="0"/>
               </a:rPr>
-              <a:t>Tested </a:t>
+              <a:t>Tested the model in a behavioral experiment. We found strong support for </a:t>
             </a:r>
             <a:r>
               <a:rPr lang="en-US" sz="3600" dirty="0" smtClean="0">
@@ -4582,7 +4404,7 @@
                 <a:ea typeface="Raleway" charset="0"/>
                 <a:cs typeface="Raleway" charset="0"/>
               </a:rPr>
-              <a:t>the model in </a:t>
+              <a:t>our </a:t>
             </a:r>
             <a:r>
               <a:rPr lang="en-US" sz="3600" dirty="0" smtClean="0">
@@ -4593,10 +4415,10 @@
                 <a:ea typeface="Raleway" charset="0"/>
                 <a:cs typeface="Raleway" charset="0"/>
               </a:rPr>
-              <a:t>a behavioral experiment. We found strong support for ours </a:t>
-            </a:r>
-            <a:r>
-              <a:rPr lang="en-US" sz="3600" dirty="0" smtClean="0">
+              <a:t>model, supporting contrast </a:t>
+            </a:r>
+            <a:r>
+              <a:rPr lang="en-US" sz="3600" dirty="0">
                 <a:solidFill>
                   <a:schemeClr val="accent6"/>
                 </a:solidFill>
@@ -4604,7 +4426,7 @@
                 <a:ea typeface="Raleway" charset="0"/>
                 <a:cs typeface="Raleway" charset="0"/>
               </a:rPr>
-              <a:t>model, supporting </a:t>
+              <a:t>a</a:t>
             </a:r>
             <a:r>
               <a:rPr lang="en-US" sz="3600" dirty="0" smtClean="0">
@@ -4615,73 +4437,7 @@
                 <a:ea typeface="Raleway" charset="0"/>
                 <a:cs typeface="Raleway" charset="0"/>
               </a:rPr>
-              <a:t>contrast </a:t>
-            </a:r>
-            <a:r>
-              <a:rPr lang="en-US" sz="3600" dirty="0">
-                <a:solidFill>
-                  <a:schemeClr val="accent6"/>
-                </a:solidFill>
-                <a:latin typeface="Raleway" charset="0"/>
-                <a:ea typeface="Raleway" charset="0"/>
-                <a:cs typeface="Raleway" charset="0"/>
-              </a:rPr>
-              <a:t>a</a:t>
-            </a:r>
-            <a:r>
-              <a:rPr lang="en-US" sz="3600" dirty="0" smtClean="0">
-                <a:solidFill>
-                  <a:schemeClr val="accent6"/>
-                </a:solidFill>
-                <a:latin typeface="Raleway" charset="0"/>
-                <a:ea typeface="Raleway" charset="0"/>
-                <a:cs typeface="Raleway" charset="0"/>
-              </a:rPr>
-              <a:t>s </a:t>
-            </a:r>
-            <a:r>
-              <a:rPr lang="en-US" sz="3600" dirty="0" smtClean="0">
-                <a:solidFill>
-                  <a:schemeClr val="accent6"/>
-                </a:solidFill>
-                <a:latin typeface="Raleway" charset="0"/>
-                <a:ea typeface="Raleway" charset="0"/>
-                <a:cs typeface="Raleway" charset="0"/>
-              </a:rPr>
-              <a:t>core </a:t>
-            </a:r>
-            <a:r>
-              <a:rPr lang="en-US" sz="3600" dirty="0" smtClean="0">
-                <a:solidFill>
-                  <a:schemeClr val="accent6"/>
-                </a:solidFill>
-                <a:latin typeface="Raleway" charset="0"/>
-                <a:ea typeface="Raleway" charset="0"/>
-                <a:cs typeface="Raleway" charset="0"/>
-              </a:rPr>
-              <a:t>constraint in </a:t>
-            </a:r>
-            <a:r>
-              <a:rPr lang="en-US" sz="3600" dirty="0" smtClean="0">
-                <a:solidFill>
-                  <a:schemeClr val="accent6"/>
-                </a:solidFill>
-                <a:latin typeface="Raleway" charset="0"/>
-                <a:ea typeface="Raleway" charset="0"/>
-                <a:cs typeface="Raleway" charset="0"/>
-              </a:rPr>
-              <a:t>category generation</a:t>
-            </a:r>
-            <a:r>
-              <a:rPr lang="en-US" sz="3600" dirty="0" smtClean="0">
-                <a:solidFill>
-                  <a:schemeClr val="accent6"/>
-                </a:solidFill>
-                <a:latin typeface="Raleway" charset="0"/>
-                <a:ea typeface="Raleway" charset="0"/>
-                <a:cs typeface="Raleway" charset="0"/>
-              </a:rPr>
-              <a:t>.</a:t>
+              <a:t>s core constraint in category generation.</a:t>
             </a:r>
             <a:endParaRPr lang="en-US" sz="4400" b="1" dirty="0">
               <a:solidFill>
@@ -4777,8 +4533,8 @@
             </a:p>
           </p:txBody>
         </p:sp>
-        <mc:AlternateContent xmlns:mc="http://schemas.openxmlformats.org/markup-compatibility/2006">
-          <mc:Choice xmlns:a14="http://schemas.microsoft.com/office/drawing/2010/main" Requires="a14">
+        <mc:AlternateContent xmlns:mc="http://schemas.openxmlformats.org/markup-compatibility/2006" xmlns:a14="http://schemas.microsoft.com/office/drawing/2010/main">
+          <mc:Choice Requires="a14">
             <p:sp>
               <p:nvSpPr>
                 <p:cNvPr id="20" name="Rectangle 19"/>
@@ -5655,18 +5411,7 @@
                       <a:ea typeface="Raleway" charset="0"/>
                       <a:cs typeface="Raleway" charset="0"/>
                     </a:rPr>
-                    <a:t>otherwise</a:t>
-                  </a:r>
-                  <a:r>
-                    <a:rPr lang="en-US" sz="3600" dirty="0" smtClean="0">
-                      <a:solidFill>
-                        <a:schemeClr val="accent6"/>
-                      </a:solidFill>
-                      <a:latin typeface="Raleway" charset="0"/>
-                      <a:ea typeface="Raleway" charset="0"/>
-                      <a:cs typeface="Raleway" charset="0"/>
-                    </a:rPr>
-                    <a:t>.</a:t>
+                    <a:t>otherwise.</a:t>
                   </a:r>
                 </a:p>
                 <a:p>
@@ -5939,7 +5684,7 @@
               </p:txBody>
             </p:sp>
           </mc:Choice>
-          <mc:Fallback>
+          <mc:Fallback xmlns="">
             <p:sp>
               <p:nvSpPr>
                 <p:cNvPr id="20" name="Rectangle 19"/>
@@ -7590,29 +7335,7 @@
                 <a:ea typeface="Raleway" charset="0"/>
                 <a:cs typeface="Raleway" charset="0"/>
               </a:rPr>
-              <a:t>: Categories </a:t>
-            </a:r>
-            <a:r>
-              <a:rPr lang="en-US" sz="3600" dirty="0" smtClean="0">
-                <a:solidFill>
-                  <a:schemeClr val="accent6"/>
-                </a:solidFill>
-                <a:latin typeface="Raleway" charset="0"/>
-                <a:ea typeface="Raleway" charset="0"/>
-                <a:cs typeface="Raleway" charset="0"/>
-              </a:rPr>
-              <a:t>were oriented to increase dissimilarity to </a:t>
-            </a:r>
-            <a:r>
-              <a:rPr lang="en-US" sz="3600" dirty="0" smtClean="0">
-                <a:solidFill>
-                  <a:schemeClr val="accent6"/>
-                </a:solidFill>
-                <a:latin typeface="Raleway" charset="0"/>
-                <a:ea typeface="Raleway" charset="0"/>
-                <a:cs typeface="Raleway" charset="0"/>
-              </a:rPr>
-              <a:t>members of the contrast category.</a:t>
+              <a:t>: Categories were oriented to increase dissimilarity to members of the contrast category.</a:t>
             </a:r>
             <a:endParaRPr lang="en-US" sz="4000" dirty="0">
               <a:solidFill>
@@ -7984,29 +7707,7 @@
                 <a:ea typeface="Raleway" charset="0"/>
                 <a:cs typeface="Raleway" charset="0"/>
               </a:rPr>
-              <a:t>Generated </a:t>
-            </a:r>
-            <a:r>
-              <a:rPr lang="en-US" sz="3600" dirty="0" smtClean="0">
-                <a:solidFill>
-                  <a:schemeClr val="accent6"/>
-                </a:solidFill>
-                <a:latin typeface="Raleway" charset="0"/>
-                <a:ea typeface="Raleway" charset="0"/>
-                <a:cs typeface="Raleway" charset="0"/>
-              </a:rPr>
-              <a:t>category members were more similar to each other than to Alphas</a:t>
-            </a:r>
-            <a:r>
-              <a:rPr lang="en-US" sz="3600" dirty="0" smtClean="0">
-                <a:solidFill>
-                  <a:schemeClr val="accent6"/>
-                </a:solidFill>
-                <a:latin typeface="Raleway" charset="0"/>
-                <a:ea typeface="Raleway" charset="0"/>
-                <a:cs typeface="Raleway" charset="0"/>
-              </a:rPr>
-              <a:t>.</a:t>
+              <a:t>Generated category members were more similar to each other than to Alphas.</a:t>
             </a:r>
             <a:endParaRPr lang="en-US" sz="3600" dirty="0">
               <a:solidFill>
@@ -8588,29 +8289,7 @@
                 <a:ea typeface="Raleway" charset="0"/>
                 <a:cs typeface="Raleway" charset="0"/>
               </a:rPr>
-              <a:t>Does contrast with a previously learned category influence </a:t>
-            </a:r>
-            <a:r>
-              <a:rPr lang="en-US" sz="3600" dirty="0" smtClean="0">
-                <a:solidFill>
-                  <a:schemeClr val="accent6"/>
-                </a:solidFill>
-                <a:latin typeface="Raleway" charset="0"/>
-                <a:ea typeface="Raleway" charset="0"/>
-                <a:cs typeface="Raleway" charset="0"/>
-              </a:rPr>
-              <a:t>generation</a:t>
-            </a:r>
-            <a:r>
-              <a:rPr lang="en-US" sz="3600" dirty="0" smtClean="0">
-                <a:solidFill>
-                  <a:schemeClr val="accent6"/>
-                </a:solidFill>
-                <a:latin typeface="Raleway" charset="0"/>
-                <a:ea typeface="Raleway" charset="0"/>
-                <a:cs typeface="Raleway" charset="0"/>
-              </a:rPr>
-              <a:t>? Is distributional emulation the only factor?</a:t>
+              <a:t>Does contrast with a previously learned category influence generation? Is distributional emulation the only factor?</a:t>
             </a:r>
           </a:p>
           <a:p>
@@ -8664,18 +8343,7 @@
                 <a:ea typeface="Raleway" charset="0"/>
                 <a:cs typeface="Raleway" charset="0"/>
               </a:rPr>
-              <a:t>; N=122) learned about an experimenter-defined category (‘Alpha’) composed of squares varying in size and color</a:t>
-            </a:r>
-            <a:r>
-              <a:rPr lang="en-US" sz="3600" dirty="0" smtClean="0">
-                <a:solidFill>
-                  <a:schemeClr val="accent6"/>
-                </a:solidFill>
-                <a:latin typeface="Raleway" charset="0"/>
-                <a:ea typeface="Raleway" charset="0"/>
-                <a:cs typeface="Raleway" charset="0"/>
-              </a:rPr>
-              <a:t>.</a:t>
+              <a:t>; N=122) learned about an experimenter-defined category (‘Alpha’) composed of squares varying in size and color.</a:t>
             </a:r>
             <a:endParaRPr lang="en-US" sz="4400" b="1" dirty="0">
               <a:solidFill>
@@ -8771,10 +8439,10 @@
                 <a:ea typeface="Raleway" charset="0"/>
                 <a:cs typeface="Raleway" charset="0"/>
               </a:rPr>
-              <a:t>Two conditions (</a:t>
-            </a:r>
-            <a:r>
-              <a:rPr lang="en-US" sz="3600" dirty="0" smtClean="0">
+              <a:t>Two conditions (Between-</a:t>
+            </a:r>
+            <a:r>
+              <a:rPr lang="en-US" sz="3600" dirty="0">
                 <a:solidFill>
                   <a:schemeClr val="accent6"/>
                 </a:solidFill>
@@ -8782,10 +8450,10 @@
                 <a:ea typeface="Raleway" charset="0"/>
                 <a:cs typeface="Raleway" charset="0"/>
               </a:rPr>
-              <a:t>Between-</a:t>
-            </a:r>
-            <a:r>
-              <a:rPr lang="en-US" sz="3600" dirty="0">
+              <a:t>P</a:t>
+            </a:r>
+            <a:r>
+              <a:rPr lang="en-US" sz="3600" dirty="0" smtClean="0">
                 <a:solidFill>
                   <a:schemeClr val="accent6"/>
                 </a:solidFill>
@@ -8793,29 +8461,7 @@
                 <a:ea typeface="Raleway" charset="0"/>
                 <a:cs typeface="Raleway" charset="0"/>
               </a:rPr>
-              <a:t>P</a:t>
-            </a:r>
-            <a:r>
-              <a:rPr lang="en-US" sz="3600" dirty="0" smtClean="0">
-                <a:solidFill>
-                  <a:schemeClr val="accent6"/>
-                </a:solidFill>
-                <a:latin typeface="Raleway" charset="0"/>
-                <a:ea typeface="Raleway" charset="0"/>
-                <a:cs typeface="Raleway" charset="0"/>
-              </a:rPr>
-              <a:t>s</a:t>
-            </a:r>
-            <a:r>
-              <a:rPr lang="en-US" sz="3600" dirty="0" smtClean="0">
-                <a:solidFill>
-                  <a:schemeClr val="accent6"/>
-                </a:solidFill>
-                <a:latin typeface="Raleway" charset="0"/>
-                <a:ea typeface="Raleway" charset="0"/>
-                <a:cs typeface="Raleway" charset="0"/>
-              </a:rPr>
-              <a:t>) differed only in category location. </a:t>
+              <a:t>s) differed only in category location. </a:t>
             </a:r>
           </a:p>
           <a:p>
@@ -8833,10 +8479,10 @@
                 <a:ea typeface="Raleway" charset="0"/>
                 <a:cs typeface="Raleway" charset="0"/>
               </a:rPr>
-              <a:t>Condition differences cannot be explained by distributional copying</a:t>
-            </a:r>
-            <a:r>
-              <a:rPr lang="en-US" sz="3600" i="1" dirty="0" smtClean="0">
+              <a:t>Condition differences cannot be explained </a:t>
+            </a:r>
+            <a:r>
+              <a:rPr lang="en-US" sz="3600" i="1" smtClean="0">
                 <a:solidFill>
                   <a:schemeClr val="accent6"/>
                 </a:solidFill>
@@ -8844,8 +8490,27 @@
                 <a:ea typeface="Raleway" charset="0"/>
                 <a:cs typeface="Raleway" charset="0"/>
               </a:rPr>
-              <a:t>.</a:t>
-            </a:r>
+              <a:t>by </a:t>
+            </a:r>
+            <a:r>
+              <a:rPr lang="en-US" sz="3600" i="1" smtClean="0">
+                <a:solidFill>
+                  <a:schemeClr val="accent6"/>
+                </a:solidFill>
+                <a:latin typeface="Raleway" charset="0"/>
+                <a:ea typeface="Raleway" charset="0"/>
+                <a:cs typeface="Raleway" charset="0"/>
+              </a:rPr>
+              <a:t>sharing distributional info.</a:t>
+            </a:r>
+            <a:endParaRPr lang="en-US" sz="3600" i="1" dirty="0" smtClean="0">
+              <a:solidFill>
+                <a:schemeClr val="accent6"/>
+              </a:solidFill>
+              <a:latin typeface="Raleway" charset="0"/>
+              <a:ea typeface="Raleway" charset="0"/>
+              <a:cs typeface="Raleway" charset="0"/>
+            </a:endParaRPr>
           </a:p>
           <a:p>
             <a:pPr>

</xml_diff>

<commit_message>
hotfix for the poster
</commit_message>
<xml_diff>
--- a/Presentations/cogsci-2017-poster.pptx
+++ b/Presentations/cogsci-2017-poster.pptx
@@ -228,7 +228,7 @@
           <a:p>
             <a:fld id="{CDC9373C-994F-E447-87BC-0883031F8899}" type="datetimeFigureOut">
               <a:rPr lang="en-US" smtClean="0"/>
-              <a:t>7/9/17</a:t>
+              <a:t>7/11/17</a:t>
             </a:fld>
             <a:endParaRPr lang="en-US"/>
           </a:p>
@@ -736,7 +736,7 @@
           <a:p>
             <a:fld id="{BE537D98-B3AD-A54B-94FE-0511E43D51EA}" type="datetimeFigureOut">
               <a:rPr lang="en-US" smtClean="0"/>
-              <a:t>7/9/17</a:t>
+              <a:t>7/11/17</a:t>
             </a:fld>
             <a:endParaRPr lang="en-US"/>
           </a:p>
@@ -901,7 +901,7 @@
           <a:p>
             <a:fld id="{BE537D98-B3AD-A54B-94FE-0511E43D51EA}" type="datetimeFigureOut">
               <a:rPr lang="en-US" smtClean="0"/>
-              <a:t>7/9/17</a:t>
+              <a:t>7/11/17</a:t>
             </a:fld>
             <a:endParaRPr lang="en-US"/>
           </a:p>
@@ -1076,7 +1076,7 @@
           <a:p>
             <a:fld id="{BE537D98-B3AD-A54B-94FE-0511E43D51EA}" type="datetimeFigureOut">
               <a:rPr lang="en-US" smtClean="0"/>
-              <a:t>7/9/17</a:t>
+              <a:t>7/11/17</a:t>
             </a:fld>
             <a:endParaRPr lang="en-US"/>
           </a:p>
@@ -1241,7 +1241,7 @@
           <a:p>
             <a:fld id="{BE537D98-B3AD-A54B-94FE-0511E43D51EA}" type="datetimeFigureOut">
               <a:rPr lang="en-US" smtClean="0"/>
-              <a:t>7/9/17</a:t>
+              <a:t>7/11/17</a:t>
             </a:fld>
             <a:endParaRPr lang="en-US"/>
           </a:p>
@@ -1480,7 +1480,7 @@
           <a:p>
             <a:fld id="{BE537D98-B3AD-A54B-94FE-0511E43D51EA}" type="datetimeFigureOut">
               <a:rPr lang="en-US" smtClean="0"/>
-              <a:t>7/9/17</a:t>
+              <a:t>7/11/17</a:t>
             </a:fld>
             <a:endParaRPr lang="en-US"/>
           </a:p>
@@ -1707,7 +1707,7 @@
           <a:p>
             <a:fld id="{BE537D98-B3AD-A54B-94FE-0511E43D51EA}" type="datetimeFigureOut">
               <a:rPr lang="en-US" smtClean="0"/>
-              <a:t>7/9/17</a:t>
+              <a:t>7/11/17</a:t>
             </a:fld>
             <a:endParaRPr lang="en-US"/>
           </a:p>
@@ -2069,7 +2069,7 @@
           <a:p>
             <a:fld id="{BE537D98-B3AD-A54B-94FE-0511E43D51EA}" type="datetimeFigureOut">
               <a:rPr lang="en-US" smtClean="0"/>
-              <a:t>7/9/17</a:t>
+              <a:t>7/11/17</a:t>
             </a:fld>
             <a:endParaRPr lang="en-US"/>
           </a:p>
@@ -2182,7 +2182,7 @@
           <a:p>
             <a:fld id="{BE537D98-B3AD-A54B-94FE-0511E43D51EA}" type="datetimeFigureOut">
               <a:rPr lang="en-US" smtClean="0"/>
-              <a:t>7/9/17</a:t>
+              <a:t>7/11/17</a:t>
             </a:fld>
             <a:endParaRPr lang="en-US"/>
           </a:p>
@@ -2272,7 +2272,7 @@
           <a:p>
             <a:fld id="{BE537D98-B3AD-A54B-94FE-0511E43D51EA}" type="datetimeFigureOut">
               <a:rPr lang="en-US" smtClean="0"/>
-              <a:t>7/9/17</a:t>
+              <a:t>7/11/17</a:t>
             </a:fld>
             <a:endParaRPr lang="en-US"/>
           </a:p>
@@ -2544,7 +2544,7 @@
           <a:p>
             <a:fld id="{BE537D98-B3AD-A54B-94FE-0511E43D51EA}" type="datetimeFigureOut">
               <a:rPr lang="en-US" smtClean="0"/>
-              <a:t>7/9/17</a:t>
+              <a:t>7/11/17</a:t>
             </a:fld>
             <a:endParaRPr lang="en-US"/>
           </a:p>
@@ -2796,7 +2796,7 @@
           <a:p>
             <a:fld id="{BE537D98-B3AD-A54B-94FE-0511E43D51EA}" type="datetimeFigureOut">
               <a:rPr lang="en-US" smtClean="0"/>
-              <a:t>7/9/17</a:t>
+              <a:t>7/11/17</a:t>
             </a:fld>
             <a:endParaRPr lang="en-US"/>
           </a:p>
@@ -3007,7 +3007,7 @@
           <a:p>
             <a:fld id="{BE537D98-B3AD-A54B-94FE-0511E43D51EA}" type="datetimeFigureOut">
               <a:rPr lang="en-US" smtClean="0"/>
-              <a:t>7/9/17</a:t>
+              <a:t>7/11/17</a:t>
             </a:fld>
             <a:endParaRPr lang="en-US"/>
           </a:p>
@@ -4393,29 +4393,7 @@
                 <a:ea typeface="Raleway" charset="0"/>
                 <a:cs typeface="Raleway" charset="0"/>
               </a:rPr>
-              <a:t>Tested the model in a behavioral experiment. We found strong support for </a:t>
-            </a:r>
-            <a:r>
-              <a:rPr lang="en-US" sz="3600" dirty="0" smtClean="0">
-                <a:solidFill>
-                  <a:schemeClr val="accent6"/>
-                </a:solidFill>
-                <a:latin typeface="Raleway" charset="0"/>
-                <a:ea typeface="Raleway" charset="0"/>
-                <a:cs typeface="Raleway" charset="0"/>
-              </a:rPr>
-              <a:t>our </a:t>
-            </a:r>
-            <a:r>
-              <a:rPr lang="en-US" sz="3600" dirty="0" smtClean="0">
-                <a:solidFill>
-                  <a:schemeClr val="accent6"/>
-                </a:solidFill>
-                <a:latin typeface="Raleway" charset="0"/>
-                <a:ea typeface="Raleway" charset="0"/>
-                <a:cs typeface="Raleway" charset="0"/>
-              </a:rPr>
-              <a:t>model, supporting contrast </a:t>
+              <a:t>Tested the model in a behavioral experiment. We found strong support for our model, supporting contrast </a:t>
             </a:r>
             <a:r>
               <a:rPr lang="en-US" sz="3600" dirty="0">
@@ -8479,10 +8457,10 @@
                 <a:ea typeface="Raleway" charset="0"/>
                 <a:cs typeface="Raleway" charset="0"/>
               </a:rPr>
-              <a:t>Condition differences cannot be explained </a:t>
-            </a:r>
-            <a:r>
-              <a:rPr lang="en-US" sz="3600" i="1" smtClean="0">
+              <a:t>Differences </a:t>
+            </a:r>
+            <a:r>
+              <a:rPr lang="en-US" sz="3600" i="1" dirty="0" smtClean="0">
                 <a:solidFill>
                   <a:schemeClr val="accent6"/>
                 </a:solidFill>
@@ -8490,27 +8468,8 @@
                 <a:ea typeface="Raleway" charset="0"/>
                 <a:cs typeface="Raleway" charset="0"/>
               </a:rPr>
-              <a:t>by </a:t>
-            </a:r>
-            <a:r>
-              <a:rPr lang="en-US" sz="3600" i="1" smtClean="0">
-                <a:solidFill>
-                  <a:schemeClr val="accent6"/>
-                </a:solidFill>
-                <a:latin typeface="Raleway" charset="0"/>
-                <a:ea typeface="Raleway" charset="0"/>
-                <a:cs typeface="Raleway" charset="0"/>
-              </a:rPr>
-              <a:t>sharing distributional info.</a:t>
-            </a:r>
-            <a:endParaRPr lang="en-US" sz="3600" i="1" dirty="0" smtClean="0">
-              <a:solidFill>
-                <a:schemeClr val="accent6"/>
-              </a:solidFill>
-              <a:latin typeface="Raleway" charset="0"/>
-              <a:ea typeface="Raleway" charset="0"/>
-              <a:cs typeface="Raleway" charset="0"/>
-            </a:endParaRPr>
+              <a:t>cannot be explained by sharing distributional info.</a:t>
+            </a:r>
           </a:p>
           <a:p>
             <a:pPr>

</xml_diff>

<commit_message>
hotfix for the hotfix for the poster
</commit_message>
<xml_diff>
--- a/Presentations/cogsci-2017-poster.pptx
+++ b/Presentations/cogsci-2017-poster.pptx
@@ -5,11 +5,10 @@
     <p:sldMasterId id="2147483672" r:id="rId1"/>
   </p:sldMasterIdLst>
   <p:notesMasterIdLst>
-    <p:notesMasterId r:id="rId4"/>
+    <p:notesMasterId r:id="rId3"/>
   </p:notesMasterIdLst>
   <p:sldIdLst>
     <p:sldId id="256" r:id="rId2"/>
-    <p:sldId id="257" r:id="rId3"/>
   </p:sldIdLst>
   <p:sldSz cx="45720000" cy="30175200"/>
   <p:notesSz cx="6858000" cy="9144000"/>
@@ -114,7 +113,6 @@
         <p14:section name="Untitled Section" id="{602BA7F9-4C83-0042-858A-3E6245077966}">
           <p14:sldIdLst>
             <p14:sldId id="256"/>
-            <p14:sldId id="257"/>
           </p14:sldIdLst>
         </p14:section>
       </p14:sectionLst>
@@ -8457,18 +8455,7 @@
                 <a:ea typeface="Raleway" charset="0"/>
                 <a:cs typeface="Raleway" charset="0"/>
               </a:rPr>
-              <a:t>Differences </a:t>
-            </a:r>
-            <a:r>
-              <a:rPr lang="en-US" sz="3600" i="1" dirty="0" smtClean="0">
-                <a:solidFill>
-                  <a:schemeClr val="accent6"/>
-                </a:solidFill>
-                <a:latin typeface="Raleway" charset="0"/>
-                <a:ea typeface="Raleway" charset="0"/>
-                <a:cs typeface="Raleway" charset="0"/>
-              </a:rPr>
-              <a:t>cannot be explained by sharing distributional info.</a:t>
+              <a:t>Differences cannot be explained by sharing distributional info.</a:t>
             </a:r>
           </a:p>
           <a:p>
@@ -10008,465 +9995,6 @@
 </p:sld>
 </file>
 
-<file path=ppt/slides/slide2.xml><?xml version="1.0" encoding="utf-8"?>
-<p:sld xmlns:a="http://schemas.openxmlformats.org/drawingml/2006/main" xmlns:r="http://schemas.openxmlformats.org/officeDocument/2006/relationships" xmlns:p="http://schemas.openxmlformats.org/presentationml/2006/main">
-  <p:cSld>
-    <p:spTree>
-      <p:nvGrpSpPr>
-        <p:cNvPr id="1" name=""/>
-        <p:cNvGrpSpPr/>
-        <p:nvPr/>
-      </p:nvGrpSpPr>
-      <p:grpSpPr>
-        <a:xfrm>
-          <a:off x="0" y="0"/>
-          <a:ext cx="0" cy="0"/>
-          <a:chOff x="0" y="0"/>
-          <a:chExt cx="0" cy="0"/>
-        </a:xfrm>
-      </p:grpSpPr>
-      <p:grpSp>
-        <p:nvGrpSpPr>
-          <p:cNvPr id="13" name="Group 12"/>
-          <p:cNvGrpSpPr/>
-          <p:nvPr/>
-        </p:nvGrpSpPr>
-        <p:grpSpPr>
-          <a:xfrm>
-            <a:off x="18772979" y="17236248"/>
-            <a:ext cx="9205429" cy="1365472"/>
-            <a:chOff x="18772979" y="17236248"/>
-            <a:chExt cx="9205429" cy="1365472"/>
-          </a:xfrm>
-        </p:grpSpPr>
-        <p:sp>
-          <p:nvSpPr>
-            <p:cNvPr id="5" name="Rectangle 4"/>
-            <p:cNvSpPr/>
-            <p:nvPr/>
-          </p:nvSpPr>
-          <p:spPr>
-            <a:xfrm>
-              <a:off x="18935807" y="17399153"/>
-              <a:ext cx="1042347" cy="1037396"/>
-            </a:xfrm>
-            <a:prstGeom prst="rect">
-              <a:avLst/>
-            </a:prstGeom>
-            <a:solidFill>
-              <a:schemeClr val="bg1"/>
-            </a:solidFill>
-            <a:ln>
-              <a:solidFill>
-                <a:schemeClr val="bg1"/>
-              </a:solidFill>
-            </a:ln>
-          </p:spPr>
-          <p:style>
-            <a:lnRef idx="2">
-              <a:schemeClr val="accent1">
-                <a:shade val="50000"/>
-              </a:schemeClr>
-            </a:lnRef>
-            <a:fillRef idx="1">
-              <a:schemeClr val="accent1"/>
-            </a:fillRef>
-            <a:effectRef idx="0">
-              <a:schemeClr val="accent1"/>
-            </a:effectRef>
-            <a:fontRef idx="minor">
-              <a:schemeClr val="lt1"/>
-            </a:fontRef>
-          </p:style>
-          <p:txBody>
-            <a:bodyPr rtlCol="0" anchor="ctr"/>
-            <a:lstStyle/>
-            <a:p>
-              <a:pPr algn="ctr"/>
-              <a:endParaRPr lang="en-US"/>
-            </a:p>
-          </p:txBody>
-        </p:sp>
-        <p:sp>
-          <p:nvSpPr>
-            <p:cNvPr id="6" name="Rectangle 5"/>
-            <p:cNvSpPr/>
-            <p:nvPr/>
-          </p:nvSpPr>
-          <p:spPr>
-            <a:xfrm>
-              <a:off x="20055425" y="17399153"/>
-              <a:ext cx="1042347" cy="1037396"/>
-            </a:xfrm>
-            <a:prstGeom prst="rect">
-              <a:avLst/>
-            </a:prstGeom>
-            <a:solidFill>
-              <a:schemeClr val="bg1"/>
-            </a:solidFill>
-            <a:ln>
-              <a:solidFill>
-                <a:schemeClr val="bg1"/>
-              </a:solidFill>
-            </a:ln>
-          </p:spPr>
-          <p:style>
-            <a:lnRef idx="2">
-              <a:schemeClr val="accent1">
-                <a:shade val="50000"/>
-              </a:schemeClr>
-            </a:lnRef>
-            <a:fillRef idx="1">
-              <a:schemeClr val="accent1"/>
-            </a:fillRef>
-            <a:effectRef idx="0">
-              <a:schemeClr val="accent1"/>
-            </a:effectRef>
-            <a:fontRef idx="minor">
-              <a:schemeClr val="lt1"/>
-            </a:fontRef>
-          </p:style>
-          <p:txBody>
-            <a:bodyPr rtlCol="0" anchor="ctr"/>
-            <a:lstStyle/>
-            <a:p>
-              <a:pPr algn="ctr"/>
-              <a:endParaRPr lang="en-US"/>
-            </a:p>
-          </p:txBody>
-        </p:sp>
-        <p:sp>
-          <p:nvSpPr>
-            <p:cNvPr id="7" name="Rectangle 6"/>
-            <p:cNvSpPr/>
-            <p:nvPr/>
-          </p:nvSpPr>
-          <p:spPr>
-            <a:xfrm>
-              <a:off x="21175043" y="17399153"/>
-              <a:ext cx="1042347" cy="1037396"/>
-            </a:xfrm>
-            <a:prstGeom prst="rect">
-              <a:avLst/>
-            </a:prstGeom>
-            <a:solidFill>
-              <a:schemeClr val="bg1"/>
-            </a:solidFill>
-            <a:ln>
-              <a:solidFill>
-                <a:schemeClr val="bg1"/>
-              </a:solidFill>
-            </a:ln>
-          </p:spPr>
-          <p:style>
-            <a:lnRef idx="2">
-              <a:schemeClr val="accent1">
-                <a:shade val="50000"/>
-              </a:schemeClr>
-            </a:lnRef>
-            <a:fillRef idx="1">
-              <a:schemeClr val="accent1"/>
-            </a:fillRef>
-            <a:effectRef idx="0">
-              <a:schemeClr val="accent1"/>
-            </a:effectRef>
-            <a:fontRef idx="minor">
-              <a:schemeClr val="lt1"/>
-            </a:fontRef>
-          </p:style>
-          <p:txBody>
-            <a:bodyPr rtlCol="0" anchor="ctr"/>
-            <a:lstStyle/>
-            <a:p>
-              <a:pPr algn="ctr"/>
-              <a:endParaRPr lang="en-US"/>
-            </a:p>
-          </p:txBody>
-        </p:sp>
-        <p:sp>
-          <p:nvSpPr>
-            <p:cNvPr id="8" name="Rectangle 7"/>
-            <p:cNvSpPr/>
-            <p:nvPr/>
-          </p:nvSpPr>
-          <p:spPr>
-            <a:xfrm>
-              <a:off x="22294661" y="17399153"/>
-              <a:ext cx="1042347" cy="1037396"/>
-            </a:xfrm>
-            <a:prstGeom prst="rect">
-              <a:avLst/>
-            </a:prstGeom>
-            <a:solidFill>
-              <a:schemeClr val="bg1"/>
-            </a:solidFill>
-            <a:ln>
-              <a:solidFill>
-                <a:schemeClr val="bg1"/>
-              </a:solidFill>
-            </a:ln>
-          </p:spPr>
-          <p:style>
-            <a:lnRef idx="2">
-              <a:schemeClr val="accent1">
-                <a:shade val="50000"/>
-              </a:schemeClr>
-            </a:lnRef>
-            <a:fillRef idx="1">
-              <a:schemeClr val="accent1"/>
-            </a:fillRef>
-            <a:effectRef idx="0">
-              <a:schemeClr val="accent1"/>
-            </a:effectRef>
-            <a:fontRef idx="minor">
-              <a:schemeClr val="lt1"/>
-            </a:fontRef>
-          </p:style>
-          <p:txBody>
-            <a:bodyPr rtlCol="0" anchor="ctr"/>
-            <a:lstStyle/>
-            <a:p>
-              <a:pPr algn="ctr"/>
-              <a:endParaRPr lang="en-US"/>
-            </a:p>
-          </p:txBody>
-        </p:sp>
-        <p:sp>
-          <p:nvSpPr>
-            <p:cNvPr id="9" name="Rectangle 8"/>
-            <p:cNvSpPr/>
-            <p:nvPr/>
-          </p:nvSpPr>
-          <p:spPr>
-            <a:xfrm>
-              <a:off x="23414279" y="17399153"/>
-              <a:ext cx="1042347" cy="1037396"/>
-            </a:xfrm>
-            <a:prstGeom prst="rect">
-              <a:avLst/>
-            </a:prstGeom>
-            <a:solidFill>
-              <a:schemeClr val="bg1"/>
-            </a:solidFill>
-            <a:ln>
-              <a:solidFill>
-                <a:schemeClr val="bg1"/>
-              </a:solidFill>
-            </a:ln>
-          </p:spPr>
-          <p:style>
-            <a:lnRef idx="2">
-              <a:schemeClr val="accent1">
-                <a:shade val="50000"/>
-              </a:schemeClr>
-            </a:lnRef>
-            <a:fillRef idx="1">
-              <a:schemeClr val="accent1"/>
-            </a:fillRef>
-            <a:effectRef idx="0">
-              <a:schemeClr val="accent1"/>
-            </a:effectRef>
-            <a:fontRef idx="minor">
-              <a:schemeClr val="lt1"/>
-            </a:fontRef>
-          </p:style>
-          <p:txBody>
-            <a:bodyPr rtlCol="0" anchor="ctr"/>
-            <a:lstStyle/>
-            <a:p>
-              <a:pPr algn="ctr"/>
-              <a:endParaRPr lang="en-US"/>
-            </a:p>
-          </p:txBody>
-        </p:sp>
-        <p:sp>
-          <p:nvSpPr>
-            <p:cNvPr id="10" name="Rectangle 9"/>
-            <p:cNvSpPr/>
-            <p:nvPr/>
-          </p:nvSpPr>
-          <p:spPr>
-            <a:xfrm>
-              <a:off x="24533897" y="17399153"/>
-              <a:ext cx="1042347" cy="1037396"/>
-            </a:xfrm>
-            <a:prstGeom prst="rect">
-              <a:avLst/>
-            </a:prstGeom>
-            <a:solidFill>
-              <a:schemeClr val="bg1"/>
-            </a:solidFill>
-            <a:ln>
-              <a:solidFill>
-                <a:schemeClr val="bg1"/>
-              </a:solidFill>
-            </a:ln>
-          </p:spPr>
-          <p:style>
-            <a:lnRef idx="2">
-              <a:schemeClr val="accent1">
-                <a:shade val="50000"/>
-              </a:schemeClr>
-            </a:lnRef>
-            <a:fillRef idx="1">
-              <a:schemeClr val="accent1"/>
-            </a:fillRef>
-            <a:effectRef idx="0">
-              <a:schemeClr val="accent1"/>
-            </a:effectRef>
-            <a:fontRef idx="minor">
-              <a:schemeClr val="lt1"/>
-            </a:fontRef>
-          </p:style>
-          <p:txBody>
-            <a:bodyPr rtlCol="0" anchor="ctr"/>
-            <a:lstStyle/>
-            <a:p>
-              <a:pPr algn="ctr"/>
-              <a:endParaRPr lang="en-US"/>
-            </a:p>
-          </p:txBody>
-        </p:sp>
-        <p:sp>
-          <p:nvSpPr>
-            <p:cNvPr id="11" name="Rectangle 10"/>
-            <p:cNvSpPr/>
-            <p:nvPr/>
-          </p:nvSpPr>
-          <p:spPr>
-            <a:xfrm>
-              <a:off x="25653515" y="17399153"/>
-              <a:ext cx="1042347" cy="1037396"/>
-            </a:xfrm>
-            <a:prstGeom prst="rect">
-              <a:avLst/>
-            </a:prstGeom>
-            <a:solidFill>
-              <a:schemeClr val="bg1"/>
-            </a:solidFill>
-            <a:ln>
-              <a:solidFill>
-                <a:schemeClr val="bg1"/>
-              </a:solidFill>
-            </a:ln>
-          </p:spPr>
-          <p:style>
-            <a:lnRef idx="2">
-              <a:schemeClr val="accent1">
-                <a:shade val="50000"/>
-              </a:schemeClr>
-            </a:lnRef>
-            <a:fillRef idx="1">
-              <a:schemeClr val="accent1"/>
-            </a:fillRef>
-            <a:effectRef idx="0">
-              <a:schemeClr val="accent1"/>
-            </a:effectRef>
-            <a:fontRef idx="minor">
-              <a:schemeClr val="lt1"/>
-            </a:fontRef>
-          </p:style>
-          <p:txBody>
-            <a:bodyPr rtlCol="0" anchor="ctr"/>
-            <a:lstStyle/>
-            <a:p>
-              <a:pPr algn="ctr"/>
-              <a:endParaRPr lang="en-US"/>
-            </a:p>
-          </p:txBody>
-        </p:sp>
-        <p:sp>
-          <p:nvSpPr>
-            <p:cNvPr id="12" name="Rectangle 11"/>
-            <p:cNvSpPr/>
-            <p:nvPr/>
-          </p:nvSpPr>
-          <p:spPr>
-            <a:xfrm>
-              <a:off x="26773133" y="17399153"/>
-              <a:ext cx="1042347" cy="1037396"/>
-            </a:xfrm>
-            <a:prstGeom prst="rect">
-              <a:avLst/>
-            </a:prstGeom>
-            <a:solidFill>
-              <a:schemeClr val="bg1"/>
-            </a:solidFill>
-            <a:ln>
-              <a:solidFill>
-                <a:schemeClr val="bg1"/>
-              </a:solidFill>
-            </a:ln>
-          </p:spPr>
-          <p:style>
-            <a:lnRef idx="2">
-              <a:schemeClr val="accent1">
-                <a:shade val="50000"/>
-              </a:schemeClr>
-            </a:lnRef>
-            <a:fillRef idx="1">
-              <a:schemeClr val="accent1"/>
-            </a:fillRef>
-            <a:effectRef idx="0">
-              <a:schemeClr val="accent1"/>
-            </a:effectRef>
-            <a:fontRef idx="minor">
-              <a:schemeClr val="lt1"/>
-            </a:fontRef>
-          </p:style>
-          <p:txBody>
-            <a:bodyPr rtlCol="0" anchor="ctr"/>
-            <a:lstStyle/>
-            <a:p>
-              <a:pPr algn="ctr"/>
-              <a:endParaRPr lang="en-US"/>
-            </a:p>
-          </p:txBody>
-        </p:sp>
-        <p:pic>
-          <p:nvPicPr>
-            <p:cNvPr id="4" name="Picture 3"/>
-            <p:cNvPicPr>
-              <a:picLocks noChangeAspect="1"/>
-            </p:cNvPicPr>
-            <p:nvPr/>
-          </p:nvPicPr>
-          <p:blipFill>
-            <a:blip r:embed="rId2">
-              <a:extLst>
-                <a:ext uri="{28A0092B-C50C-407E-A947-70E740481C1C}">
-                  <a14:useLocalDpi xmlns:a14="http://schemas.microsoft.com/office/drawing/2010/main" val="0"/>
-                </a:ext>
-              </a:extLst>
-            </a:blip>
-            <a:stretch>
-              <a:fillRect/>
-            </a:stretch>
-          </p:blipFill>
-          <p:spPr>
-            <a:xfrm>
-              <a:off x="18772979" y="17236248"/>
-              <a:ext cx="9205429" cy="1365472"/>
-            </a:xfrm>
-            <a:prstGeom prst="rect">
-              <a:avLst/>
-            </a:prstGeom>
-          </p:spPr>
-        </p:pic>
-      </p:grpSp>
-    </p:spTree>
-    <p:extLst>
-      <p:ext uri="{BB962C8B-B14F-4D97-AF65-F5344CB8AC3E}">
-        <p14:creationId xmlns:p14="http://schemas.microsoft.com/office/powerpoint/2010/main" val="1561931220"/>
-      </p:ext>
-    </p:extLst>
-  </p:cSld>
-  <p:clrMapOvr>
-    <a:masterClrMapping/>
-  </p:clrMapOvr>
-</p:sld>
-</file>
-
 <file path=ppt/theme/theme1.xml><?xml version="1.0" encoding="utf-8"?>
 <a:theme xmlns:a="http://schemas.openxmlformats.org/drawingml/2006/main" name="Office Theme">
   <a:themeElements>

</xml_diff>